<commit_message>
complete draft of Reportability Response Proifile using Communication and PlanDefinition resource
</commit_message>
<xml_diff>
--- a/notes/EICR_Options.pptx
+++ b/notes/EICR_Options.pptx
@@ -8,16 +8,16 @@
     <p:sldId id="256" r:id="rId2"/>
     <p:sldId id="267" r:id="rId3"/>
     <p:sldId id="259" r:id="rId4"/>
-    <p:sldId id="268" r:id="rId5"/>
-    <p:sldId id="257" r:id="rId6"/>
-    <p:sldId id="265" r:id="rId7"/>
-    <p:sldId id="260" r:id="rId8"/>
-    <p:sldId id="261" r:id="rId9"/>
-    <p:sldId id="266" r:id="rId10"/>
-    <p:sldId id="258" r:id="rId11"/>
-    <p:sldId id="263" r:id="rId12"/>
-    <p:sldId id="262" r:id="rId13"/>
-    <p:sldId id="264" r:id="rId14"/>
+    <p:sldId id="269" r:id="rId5"/>
+    <p:sldId id="268" r:id="rId6"/>
+    <p:sldId id="257" r:id="rId7"/>
+    <p:sldId id="265" r:id="rId8"/>
+    <p:sldId id="260" r:id="rId9"/>
+    <p:sldId id="261" r:id="rId10"/>
+    <p:sldId id="266" r:id="rId11"/>
+    <p:sldId id="258" r:id="rId12"/>
+    <p:sldId id="263" r:id="rId13"/>
+    <p:sldId id="262" r:id="rId14"/>
   </p:sldIdLst>
   <p:sldSz cx="12192000" cy="6858000"/>
   <p:notesSz cx="6858000" cy="9144000"/>
@@ -4709,10 +4709,24 @@
     <dgm:pt modelId="{A98C3C44-1F70-044A-AC81-C4B2067E0E9D}" type="pres">
       <dgm:prSet presAssocID="{FE1AB13B-C597-F34D-A479-CE663780534F}" presName="sibTrans" presStyleLbl="sibTrans2D1" presStyleIdx="0" presStyleCnt="1"/>
       <dgm:spPr/>
+      <dgm:t>
+        <a:bodyPr/>
+        <a:lstStyle/>
+        <a:p>
+          <a:endParaRPr lang="en-US"/>
+        </a:p>
+      </dgm:t>
     </dgm:pt>
     <dgm:pt modelId="{4025DC42-AC2E-7A49-A4DD-BBAFDA42D48F}" type="pres">
       <dgm:prSet presAssocID="{FE1AB13B-C597-F34D-A479-CE663780534F}" presName="connectorText" presStyleLbl="sibTrans2D1" presStyleIdx="0" presStyleCnt="1"/>
       <dgm:spPr/>
+      <dgm:t>
+        <a:bodyPr/>
+        <a:lstStyle/>
+        <a:p>
+          <a:endParaRPr lang="en-US"/>
+        </a:p>
+      </dgm:t>
     </dgm:pt>
     <dgm:pt modelId="{EB0EF557-637B-4047-B938-B5BB8807EB49}" type="pres">
       <dgm:prSet presAssocID="{EFF79344-E65E-C74B-A3E8-4C1C4FC2C637}" presName="node" presStyleLbl="node1" presStyleIdx="1" presStyleCnt="2">
@@ -4731,13 +4745,13 @@
     </dgm:pt>
   </dgm:ptLst>
   <dgm:cxnLst>
-    <dgm:cxn modelId="{063F5E6E-DA35-1642-AEE1-ADA65DA5BC14}" srcId="{FC021296-0374-4641-830E-E938FFFB89D9}" destId="{EFF79344-E65E-C74B-A3E8-4C1C4FC2C637}" srcOrd="1" destOrd="0" parTransId="{69CACD31-5EF7-0843-8B8D-91A92BA07B5C}" sibTransId="{DC0F101D-25BB-5940-BCE9-577389D823B2}"/>
-    <dgm:cxn modelId="{26A9B4D5-CE0A-4547-9C09-7955D4A2DD31}" type="presOf" srcId="{FFFD9405-5240-2D41-825B-385FD35A5E00}" destId="{CDF89ECA-9165-1447-81C9-839A742A582C}" srcOrd="0" destOrd="0" presId="urn:microsoft.com/office/officeart/2005/8/layout/process1"/>
-    <dgm:cxn modelId="{50EA06F4-9006-3D4B-9C00-3B132A0FBC19}" type="presOf" srcId="{FE1AB13B-C597-F34D-A479-CE663780534F}" destId="{A98C3C44-1F70-044A-AC81-C4B2067E0E9D}" srcOrd="0" destOrd="0" presId="urn:microsoft.com/office/officeart/2005/8/layout/process1"/>
+    <dgm:cxn modelId="{B59E155C-BC71-FC49-9E30-5927FF1BF084}" srcId="{FC021296-0374-4641-830E-E938FFFB89D9}" destId="{FFFD9405-5240-2D41-825B-385FD35A5E00}" srcOrd="0" destOrd="0" parTransId="{09E2FB89-A852-0447-A391-F9C032E61566}" sibTransId="{FE1AB13B-C597-F34D-A479-CE663780534F}"/>
     <dgm:cxn modelId="{D49CB4E2-5F2D-C54D-914C-4D68529515FC}" type="presOf" srcId="{EFF79344-E65E-C74B-A3E8-4C1C4FC2C637}" destId="{EB0EF557-637B-4047-B938-B5BB8807EB49}" srcOrd="0" destOrd="0" presId="urn:microsoft.com/office/officeart/2005/8/layout/process1"/>
     <dgm:cxn modelId="{7CE679A1-D377-1646-9231-9C1D05AE18AB}" type="presOf" srcId="{FE1AB13B-C597-F34D-A479-CE663780534F}" destId="{4025DC42-AC2E-7A49-A4DD-BBAFDA42D48F}" srcOrd="1" destOrd="0" presId="urn:microsoft.com/office/officeart/2005/8/layout/process1"/>
-    <dgm:cxn modelId="{B59E155C-BC71-FC49-9E30-5927FF1BF084}" srcId="{FC021296-0374-4641-830E-E938FFFB89D9}" destId="{FFFD9405-5240-2D41-825B-385FD35A5E00}" srcOrd="0" destOrd="0" parTransId="{09E2FB89-A852-0447-A391-F9C032E61566}" sibTransId="{FE1AB13B-C597-F34D-A479-CE663780534F}"/>
+    <dgm:cxn modelId="{26A9B4D5-CE0A-4547-9C09-7955D4A2DD31}" type="presOf" srcId="{FFFD9405-5240-2D41-825B-385FD35A5E00}" destId="{CDF89ECA-9165-1447-81C9-839A742A582C}" srcOrd="0" destOrd="0" presId="urn:microsoft.com/office/officeart/2005/8/layout/process1"/>
     <dgm:cxn modelId="{AA008D6A-A5BD-3E4C-B93E-608CA18B0882}" type="presOf" srcId="{FC021296-0374-4641-830E-E938FFFB89D9}" destId="{A02582D2-08FC-DE4B-80BD-98FD84744CF8}" srcOrd="0" destOrd="0" presId="urn:microsoft.com/office/officeart/2005/8/layout/process1"/>
+    <dgm:cxn modelId="{063F5E6E-DA35-1642-AEE1-ADA65DA5BC14}" srcId="{FC021296-0374-4641-830E-E938FFFB89D9}" destId="{EFF79344-E65E-C74B-A3E8-4C1C4FC2C637}" srcOrd="1" destOrd="0" parTransId="{69CACD31-5EF7-0843-8B8D-91A92BA07B5C}" sibTransId="{DC0F101D-25BB-5940-BCE9-577389D823B2}"/>
+    <dgm:cxn modelId="{50EA06F4-9006-3D4B-9C00-3B132A0FBC19}" type="presOf" srcId="{FE1AB13B-C597-F34D-A479-CE663780534F}" destId="{A98C3C44-1F70-044A-AC81-C4B2067E0E9D}" srcOrd="0" destOrd="0" presId="urn:microsoft.com/office/officeart/2005/8/layout/process1"/>
     <dgm:cxn modelId="{FF17B64E-4C03-A64F-B45C-ADD493367BFC}" type="presParOf" srcId="{A02582D2-08FC-DE4B-80BD-98FD84744CF8}" destId="{CDF89ECA-9165-1447-81C9-839A742A582C}" srcOrd="0" destOrd="0" presId="urn:microsoft.com/office/officeart/2005/8/layout/process1"/>
     <dgm:cxn modelId="{D3274925-F89E-8048-8404-1A04E36D31AE}" type="presParOf" srcId="{A02582D2-08FC-DE4B-80BD-98FD84744CF8}" destId="{A98C3C44-1F70-044A-AC81-C4B2067E0E9D}" srcOrd="1" destOrd="0" presId="urn:microsoft.com/office/officeart/2005/8/layout/process1"/>
     <dgm:cxn modelId="{A77EC999-51F9-2E4F-84D5-6E40D3DBFC0B}" type="presParOf" srcId="{A98C3C44-1F70-044A-AC81-C4B2067E0E9D}" destId="{4025DC42-AC2E-7A49-A4DD-BBAFDA42D48F}" srcOrd="0" destOrd="0" presId="urn:microsoft.com/office/officeart/2005/8/layout/process1"/>
@@ -4747,7 +4761,7 @@
   <dgm:whole/>
   <dgm:extLst>
     <a:ext uri="http://schemas.microsoft.com/office/drawing/2008/diagram">
-      <dsp:dataModelExt xmlns:dsp="http://schemas.microsoft.com/office/drawing/2008/diagram" relId="rId6" minVer="http://schemas.openxmlformats.org/drawingml/2006/diagram"/>
+      <dsp:dataModelExt xmlns:dsp="http://schemas.microsoft.com/office/drawing/2008/diagram" xmlns="" relId="rId6" minVer="http://schemas.openxmlformats.org/drawingml/2006/diagram"/>
     </a:ext>
   </dgm:extLst>
 </dgm:dataModel>
@@ -4861,10 +4875,24 @@
     <dgm:pt modelId="{A98C3C44-1F70-044A-AC81-C4B2067E0E9D}" type="pres">
       <dgm:prSet presAssocID="{FE1AB13B-C597-F34D-A479-CE663780534F}" presName="sibTrans" presStyleLbl="sibTrans2D1" presStyleIdx="0" presStyleCnt="1"/>
       <dgm:spPr/>
+      <dgm:t>
+        <a:bodyPr/>
+        <a:lstStyle/>
+        <a:p>
+          <a:endParaRPr lang="en-US"/>
+        </a:p>
+      </dgm:t>
     </dgm:pt>
     <dgm:pt modelId="{4025DC42-AC2E-7A49-A4DD-BBAFDA42D48F}" type="pres">
       <dgm:prSet presAssocID="{FE1AB13B-C597-F34D-A479-CE663780534F}" presName="connectorText" presStyleLbl="sibTrans2D1" presStyleIdx="0" presStyleCnt="1"/>
       <dgm:spPr/>
+      <dgm:t>
+        <a:bodyPr/>
+        <a:lstStyle/>
+        <a:p>
+          <a:endParaRPr lang="en-US"/>
+        </a:p>
+      </dgm:t>
     </dgm:pt>
     <dgm:pt modelId="{EB0EF557-637B-4047-B938-B5BB8807EB49}" type="pres">
       <dgm:prSet presAssocID="{EFF79344-E65E-C74B-A3E8-4C1C4FC2C637}" presName="node" presStyleLbl="node1" presStyleIdx="1" presStyleCnt="2">
@@ -4883,13 +4911,13 @@
     </dgm:pt>
   </dgm:ptLst>
   <dgm:cxnLst>
+    <dgm:cxn modelId="{B59E155C-BC71-FC49-9E30-5927FF1BF084}" srcId="{FC021296-0374-4641-830E-E938FFFB89D9}" destId="{FFFD9405-5240-2D41-825B-385FD35A5E00}" srcOrd="0" destOrd="0" parTransId="{09E2FB89-A852-0447-A391-F9C032E61566}" sibTransId="{FE1AB13B-C597-F34D-A479-CE663780534F}"/>
+    <dgm:cxn modelId="{051758C8-6C07-364A-824D-1736F37D103F}" type="presOf" srcId="{EFF79344-E65E-C74B-A3E8-4C1C4FC2C637}" destId="{EB0EF557-637B-4047-B938-B5BB8807EB49}" srcOrd="0" destOrd="0" presId="urn:microsoft.com/office/officeart/2005/8/layout/process1"/>
+    <dgm:cxn modelId="{F78446AF-07C6-0740-870C-E751B1CB13A7}" type="presOf" srcId="{FE1AB13B-C597-F34D-A479-CE663780534F}" destId="{A98C3C44-1F70-044A-AC81-C4B2067E0E9D}" srcOrd="0" destOrd="0" presId="urn:microsoft.com/office/officeart/2005/8/layout/process1"/>
+    <dgm:cxn modelId="{C54E8D78-6636-7F49-8B57-05D5466FF357}" type="presOf" srcId="{FC021296-0374-4641-830E-E938FFFB89D9}" destId="{A02582D2-08FC-DE4B-80BD-98FD84744CF8}" srcOrd="0" destOrd="0" presId="urn:microsoft.com/office/officeart/2005/8/layout/process1"/>
     <dgm:cxn modelId="{EC7CB33C-4257-EF4B-9D7B-6F65E74095C2}" type="presOf" srcId="{FFFD9405-5240-2D41-825B-385FD35A5E00}" destId="{CDF89ECA-9165-1447-81C9-839A742A582C}" srcOrd="0" destOrd="0" presId="urn:microsoft.com/office/officeart/2005/8/layout/process1"/>
-    <dgm:cxn modelId="{F78446AF-07C6-0740-870C-E751B1CB13A7}" type="presOf" srcId="{FE1AB13B-C597-F34D-A479-CE663780534F}" destId="{A98C3C44-1F70-044A-AC81-C4B2067E0E9D}" srcOrd="0" destOrd="0" presId="urn:microsoft.com/office/officeart/2005/8/layout/process1"/>
-    <dgm:cxn modelId="{B59E155C-BC71-FC49-9E30-5927FF1BF084}" srcId="{FC021296-0374-4641-830E-E938FFFB89D9}" destId="{FFFD9405-5240-2D41-825B-385FD35A5E00}" srcOrd="0" destOrd="0" parTransId="{09E2FB89-A852-0447-A391-F9C032E61566}" sibTransId="{FE1AB13B-C597-F34D-A479-CE663780534F}"/>
-    <dgm:cxn modelId="{C54E8D78-6636-7F49-8B57-05D5466FF357}" type="presOf" srcId="{FC021296-0374-4641-830E-E938FFFB89D9}" destId="{A02582D2-08FC-DE4B-80BD-98FD84744CF8}" srcOrd="0" destOrd="0" presId="urn:microsoft.com/office/officeart/2005/8/layout/process1"/>
-    <dgm:cxn modelId="{051758C8-6C07-364A-824D-1736F37D103F}" type="presOf" srcId="{EFF79344-E65E-C74B-A3E8-4C1C4FC2C637}" destId="{EB0EF557-637B-4047-B938-B5BB8807EB49}" srcOrd="0" destOrd="0" presId="urn:microsoft.com/office/officeart/2005/8/layout/process1"/>
+    <dgm:cxn modelId="{063F5E6E-DA35-1642-AEE1-ADA65DA5BC14}" srcId="{FC021296-0374-4641-830E-E938FFFB89D9}" destId="{EFF79344-E65E-C74B-A3E8-4C1C4FC2C637}" srcOrd="1" destOrd="0" parTransId="{69CACD31-5EF7-0843-8B8D-91A92BA07B5C}" sibTransId="{DC0F101D-25BB-5940-BCE9-577389D823B2}"/>
     <dgm:cxn modelId="{3EBC425A-66DB-B44E-BB29-E44855441DA4}" type="presOf" srcId="{FE1AB13B-C597-F34D-A479-CE663780534F}" destId="{4025DC42-AC2E-7A49-A4DD-BBAFDA42D48F}" srcOrd="1" destOrd="0" presId="urn:microsoft.com/office/officeart/2005/8/layout/process1"/>
-    <dgm:cxn modelId="{063F5E6E-DA35-1642-AEE1-ADA65DA5BC14}" srcId="{FC021296-0374-4641-830E-E938FFFB89D9}" destId="{EFF79344-E65E-C74B-A3E8-4C1C4FC2C637}" srcOrd="1" destOrd="0" parTransId="{69CACD31-5EF7-0843-8B8D-91A92BA07B5C}" sibTransId="{DC0F101D-25BB-5940-BCE9-577389D823B2}"/>
     <dgm:cxn modelId="{91D01590-D0A9-0843-B6B4-5DCB96BAEFFC}" type="presParOf" srcId="{A02582D2-08FC-DE4B-80BD-98FD84744CF8}" destId="{CDF89ECA-9165-1447-81C9-839A742A582C}" srcOrd="0" destOrd="0" presId="urn:microsoft.com/office/officeart/2005/8/layout/process1"/>
     <dgm:cxn modelId="{1222AD3C-245F-6543-AC00-6D895067204A}" type="presParOf" srcId="{A02582D2-08FC-DE4B-80BD-98FD84744CF8}" destId="{A98C3C44-1F70-044A-AC81-C4B2067E0E9D}" srcOrd="1" destOrd="0" presId="urn:microsoft.com/office/officeart/2005/8/layout/process1"/>
     <dgm:cxn modelId="{7181C141-E85E-684C-9770-54C1222D3E56}" type="presParOf" srcId="{A98C3C44-1F70-044A-AC81-C4B2067E0E9D}" destId="{4025DC42-AC2E-7A49-A4DD-BBAFDA42D48F}" srcOrd="0" destOrd="0" presId="urn:microsoft.com/office/officeart/2005/8/layout/process1"/>
@@ -4899,7 +4927,7 @@
   <dgm:whole/>
   <dgm:extLst>
     <a:ext uri="http://schemas.microsoft.com/office/drawing/2008/diagram">
-      <dsp:dataModelExt xmlns:dsp="http://schemas.microsoft.com/office/drawing/2008/diagram" relId="rId6" minVer="http://schemas.openxmlformats.org/drawingml/2006/diagram"/>
+      <dsp:dataModelExt xmlns:dsp="http://schemas.microsoft.com/office/drawing/2008/diagram" xmlns="" relId="rId6" minVer="http://schemas.openxmlformats.org/drawingml/2006/diagram"/>
     </a:ext>
   </dgm:extLst>
 </dgm:dataModel>
@@ -5021,10 +5049,24 @@
     <dgm:pt modelId="{A98C3C44-1F70-044A-AC81-C4B2067E0E9D}" type="pres">
       <dgm:prSet presAssocID="{FE1AB13B-C597-F34D-A479-CE663780534F}" presName="sibTrans" presStyleLbl="sibTrans2D1" presStyleIdx="0" presStyleCnt="1"/>
       <dgm:spPr/>
+      <dgm:t>
+        <a:bodyPr/>
+        <a:lstStyle/>
+        <a:p>
+          <a:endParaRPr lang="en-US"/>
+        </a:p>
+      </dgm:t>
     </dgm:pt>
     <dgm:pt modelId="{4025DC42-AC2E-7A49-A4DD-BBAFDA42D48F}" type="pres">
       <dgm:prSet presAssocID="{FE1AB13B-C597-F34D-A479-CE663780534F}" presName="connectorText" presStyleLbl="sibTrans2D1" presStyleIdx="0" presStyleCnt="1"/>
       <dgm:spPr/>
+      <dgm:t>
+        <a:bodyPr/>
+        <a:lstStyle/>
+        <a:p>
+          <a:endParaRPr lang="en-US"/>
+        </a:p>
+      </dgm:t>
     </dgm:pt>
     <dgm:pt modelId="{EB0EF557-637B-4047-B938-B5BB8807EB49}" type="pres">
       <dgm:prSet presAssocID="{EFF79344-E65E-C74B-A3E8-4C1C4FC2C637}" presName="node" presStyleLbl="node1" presStyleIdx="1" presStyleCnt="2">
@@ -5043,13 +5085,13 @@
     </dgm:pt>
   </dgm:ptLst>
   <dgm:cxnLst>
+    <dgm:cxn modelId="{B59E155C-BC71-FC49-9E30-5927FF1BF084}" srcId="{FC021296-0374-4641-830E-E938FFFB89D9}" destId="{FFFD9405-5240-2D41-825B-385FD35A5E00}" srcOrd="0" destOrd="0" parTransId="{09E2FB89-A852-0447-A391-F9C032E61566}" sibTransId="{FE1AB13B-C597-F34D-A479-CE663780534F}"/>
+    <dgm:cxn modelId="{4D1E6C63-2274-C54C-ADB2-151659415046}" type="presOf" srcId="{FE1AB13B-C597-F34D-A479-CE663780534F}" destId="{A98C3C44-1F70-044A-AC81-C4B2067E0E9D}" srcOrd="0" destOrd="0" presId="urn:microsoft.com/office/officeart/2005/8/layout/process1"/>
     <dgm:cxn modelId="{063F5E6E-DA35-1642-AEE1-ADA65DA5BC14}" srcId="{FC021296-0374-4641-830E-E938FFFB89D9}" destId="{EFF79344-E65E-C74B-A3E8-4C1C4FC2C637}" srcOrd="1" destOrd="0" parTransId="{69CACD31-5EF7-0843-8B8D-91A92BA07B5C}" sibTransId="{DC0F101D-25BB-5940-BCE9-577389D823B2}"/>
+    <dgm:cxn modelId="{2535F0A8-397F-9A4F-A22E-755508D43F23}" type="presOf" srcId="{FFFD9405-5240-2D41-825B-385FD35A5E00}" destId="{CDF89ECA-9165-1447-81C9-839A742A582C}" srcOrd="0" destOrd="0" presId="urn:microsoft.com/office/officeart/2005/8/layout/process1"/>
+    <dgm:cxn modelId="{95E71769-B6D0-0C42-B64D-C7A90FA190DA}" type="presOf" srcId="{FE1AB13B-C597-F34D-A479-CE663780534F}" destId="{4025DC42-AC2E-7A49-A4DD-BBAFDA42D48F}" srcOrd="1" destOrd="0" presId="urn:microsoft.com/office/officeart/2005/8/layout/process1"/>
+    <dgm:cxn modelId="{59E90EC3-19CC-FC4A-A24F-CE9D2DABEA84}" type="presOf" srcId="{EFF79344-E65E-C74B-A3E8-4C1C4FC2C637}" destId="{EB0EF557-637B-4047-B938-B5BB8807EB49}" srcOrd="0" destOrd="0" presId="urn:microsoft.com/office/officeart/2005/8/layout/process1"/>
     <dgm:cxn modelId="{F0889E37-3DB3-A849-8F0B-349506D1D8EC}" type="presOf" srcId="{FC021296-0374-4641-830E-E938FFFB89D9}" destId="{A02582D2-08FC-DE4B-80BD-98FD84744CF8}" srcOrd="0" destOrd="0" presId="urn:microsoft.com/office/officeart/2005/8/layout/process1"/>
-    <dgm:cxn modelId="{59E90EC3-19CC-FC4A-A24F-CE9D2DABEA84}" type="presOf" srcId="{EFF79344-E65E-C74B-A3E8-4C1C4FC2C637}" destId="{EB0EF557-637B-4047-B938-B5BB8807EB49}" srcOrd="0" destOrd="0" presId="urn:microsoft.com/office/officeart/2005/8/layout/process1"/>
-    <dgm:cxn modelId="{95E71769-B6D0-0C42-B64D-C7A90FA190DA}" type="presOf" srcId="{FE1AB13B-C597-F34D-A479-CE663780534F}" destId="{4025DC42-AC2E-7A49-A4DD-BBAFDA42D48F}" srcOrd="1" destOrd="0" presId="urn:microsoft.com/office/officeart/2005/8/layout/process1"/>
-    <dgm:cxn modelId="{B59E155C-BC71-FC49-9E30-5927FF1BF084}" srcId="{FC021296-0374-4641-830E-E938FFFB89D9}" destId="{FFFD9405-5240-2D41-825B-385FD35A5E00}" srcOrd="0" destOrd="0" parTransId="{09E2FB89-A852-0447-A391-F9C032E61566}" sibTransId="{FE1AB13B-C597-F34D-A479-CE663780534F}"/>
-    <dgm:cxn modelId="{2535F0A8-397F-9A4F-A22E-755508D43F23}" type="presOf" srcId="{FFFD9405-5240-2D41-825B-385FD35A5E00}" destId="{CDF89ECA-9165-1447-81C9-839A742A582C}" srcOrd="0" destOrd="0" presId="urn:microsoft.com/office/officeart/2005/8/layout/process1"/>
-    <dgm:cxn modelId="{4D1E6C63-2274-C54C-ADB2-151659415046}" type="presOf" srcId="{FE1AB13B-C597-F34D-A479-CE663780534F}" destId="{A98C3C44-1F70-044A-AC81-C4B2067E0E9D}" srcOrd="0" destOrd="0" presId="urn:microsoft.com/office/officeart/2005/8/layout/process1"/>
     <dgm:cxn modelId="{42788738-1084-D84C-9E58-9D457AEEF9F6}" type="presParOf" srcId="{A02582D2-08FC-DE4B-80BD-98FD84744CF8}" destId="{CDF89ECA-9165-1447-81C9-839A742A582C}" srcOrd="0" destOrd="0" presId="urn:microsoft.com/office/officeart/2005/8/layout/process1"/>
     <dgm:cxn modelId="{FCEEA1FE-D6D7-CD4B-829B-40219D369934}" type="presParOf" srcId="{A02582D2-08FC-DE4B-80BD-98FD84744CF8}" destId="{A98C3C44-1F70-044A-AC81-C4B2067E0E9D}" srcOrd="1" destOrd="0" presId="urn:microsoft.com/office/officeart/2005/8/layout/process1"/>
     <dgm:cxn modelId="{9500B6E1-424D-304B-A894-68BD0A063A3E}" type="presParOf" srcId="{A98C3C44-1F70-044A-AC81-C4B2067E0E9D}" destId="{4025DC42-AC2E-7A49-A4DD-BBAFDA42D48F}" srcOrd="0" destOrd="0" presId="urn:microsoft.com/office/officeart/2005/8/layout/process1"/>
@@ -5059,7 +5101,7 @@
   <dgm:whole/>
   <dgm:extLst>
     <a:ext uri="http://schemas.microsoft.com/office/drawing/2008/diagram">
-      <dsp:dataModelExt xmlns:dsp="http://schemas.microsoft.com/office/drawing/2008/diagram" relId="rId6" minVer="http://schemas.openxmlformats.org/drawingml/2006/diagram"/>
+      <dsp:dataModelExt xmlns:dsp="http://schemas.microsoft.com/office/drawing/2008/diagram" xmlns="" relId="rId6" minVer="http://schemas.openxmlformats.org/drawingml/2006/diagram"/>
     </a:ext>
   </dgm:extLst>
 </dgm:dataModel>
@@ -5177,10 +5219,24 @@
     <dgm:pt modelId="{A98C3C44-1F70-044A-AC81-C4B2067E0E9D}" type="pres">
       <dgm:prSet presAssocID="{FE1AB13B-C597-F34D-A479-CE663780534F}" presName="sibTrans" presStyleLbl="sibTrans2D1" presStyleIdx="0" presStyleCnt="1"/>
       <dgm:spPr/>
+      <dgm:t>
+        <a:bodyPr/>
+        <a:lstStyle/>
+        <a:p>
+          <a:endParaRPr lang="en-US"/>
+        </a:p>
+      </dgm:t>
     </dgm:pt>
     <dgm:pt modelId="{4025DC42-AC2E-7A49-A4DD-BBAFDA42D48F}" type="pres">
       <dgm:prSet presAssocID="{FE1AB13B-C597-F34D-A479-CE663780534F}" presName="connectorText" presStyleLbl="sibTrans2D1" presStyleIdx="0" presStyleCnt="1"/>
       <dgm:spPr/>
+      <dgm:t>
+        <a:bodyPr/>
+        <a:lstStyle/>
+        <a:p>
+          <a:endParaRPr lang="en-US"/>
+        </a:p>
+      </dgm:t>
     </dgm:pt>
     <dgm:pt modelId="{EB0EF557-637B-4047-B938-B5BB8807EB49}" type="pres">
       <dgm:prSet presAssocID="{EFF79344-E65E-C74B-A3E8-4C1C4FC2C637}" presName="node" presStyleLbl="node1" presStyleIdx="1" presStyleCnt="2">
@@ -5199,13 +5255,13 @@
     </dgm:pt>
   </dgm:ptLst>
   <dgm:cxnLst>
+    <dgm:cxn modelId="{B59E155C-BC71-FC49-9E30-5927FF1BF084}" srcId="{FC021296-0374-4641-830E-E938FFFB89D9}" destId="{FFFD9405-5240-2D41-825B-385FD35A5E00}" srcOrd="0" destOrd="0" parTransId="{09E2FB89-A852-0447-A391-F9C032E61566}" sibTransId="{FE1AB13B-C597-F34D-A479-CE663780534F}"/>
+    <dgm:cxn modelId="{31895E9F-A390-0D4B-B466-799A00287D45}" type="presOf" srcId="{FE1AB13B-C597-F34D-A479-CE663780534F}" destId="{A98C3C44-1F70-044A-AC81-C4B2067E0E9D}" srcOrd="0" destOrd="0" presId="urn:microsoft.com/office/officeart/2005/8/layout/process1"/>
+    <dgm:cxn modelId="{6B163B09-3B1C-4248-9FF0-27CC2E61971E}" type="presOf" srcId="{FE1AB13B-C597-F34D-A479-CE663780534F}" destId="{4025DC42-AC2E-7A49-A4DD-BBAFDA42D48F}" srcOrd="1" destOrd="0" presId="urn:microsoft.com/office/officeart/2005/8/layout/process1"/>
+    <dgm:cxn modelId="{B96BC59B-69AC-074F-9A58-2880137368BB}" type="presOf" srcId="{FFFD9405-5240-2D41-825B-385FD35A5E00}" destId="{CDF89ECA-9165-1447-81C9-839A742A582C}" srcOrd="0" destOrd="0" presId="urn:microsoft.com/office/officeart/2005/8/layout/process1"/>
+    <dgm:cxn modelId="{063F5E6E-DA35-1642-AEE1-ADA65DA5BC14}" srcId="{FC021296-0374-4641-830E-E938FFFB89D9}" destId="{EFF79344-E65E-C74B-A3E8-4C1C4FC2C637}" srcOrd="1" destOrd="0" parTransId="{69CACD31-5EF7-0843-8B8D-91A92BA07B5C}" sibTransId="{DC0F101D-25BB-5940-BCE9-577389D823B2}"/>
+    <dgm:cxn modelId="{FF2EEDDB-D228-3343-807F-1E5BE83DC72F}" type="presOf" srcId="{FC021296-0374-4641-830E-E938FFFB89D9}" destId="{A02582D2-08FC-DE4B-80BD-98FD84744CF8}" srcOrd="0" destOrd="0" presId="urn:microsoft.com/office/officeart/2005/8/layout/process1"/>
     <dgm:cxn modelId="{3796729D-6E8A-114F-9017-D5BC63064439}" type="presOf" srcId="{EFF79344-E65E-C74B-A3E8-4C1C4FC2C637}" destId="{EB0EF557-637B-4047-B938-B5BB8807EB49}" srcOrd="0" destOrd="0" presId="urn:microsoft.com/office/officeart/2005/8/layout/process1"/>
-    <dgm:cxn modelId="{063F5E6E-DA35-1642-AEE1-ADA65DA5BC14}" srcId="{FC021296-0374-4641-830E-E938FFFB89D9}" destId="{EFF79344-E65E-C74B-A3E8-4C1C4FC2C637}" srcOrd="1" destOrd="0" parTransId="{69CACD31-5EF7-0843-8B8D-91A92BA07B5C}" sibTransId="{DC0F101D-25BB-5940-BCE9-577389D823B2}"/>
-    <dgm:cxn modelId="{31895E9F-A390-0D4B-B466-799A00287D45}" type="presOf" srcId="{FE1AB13B-C597-F34D-A479-CE663780534F}" destId="{A98C3C44-1F70-044A-AC81-C4B2067E0E9D}" srcOrd="0" destOrd="0" presId="urn:microsoft.com/office/officeart/2005/8/layout/process1"/>
-    <dgm:cxn modelId="{B96BC59B-69AC-074F-9A58-2880137368BB}" type="presOf" srcId="{FFFD9405-5240-2D41-825B-385FD35A5E00}" destId="{CDF89ECA-9165-1447-81C9-839A742A582C}" srcOrd="0" destOrd="0" presId="urn:microsoft.com/office/officeart/2005/8/layout/process1"/>
-    <dgm:cxn modelId="{FF2EEDDB-D228-3343-807F-1E5BE83DC72F}" type="presOf" srcId="{FC021296-0374-4641-830E-E938FFFB89D9}" destId="{A02582D2-08FC-DE4B-80BD-98FD84744CF8}" srcOrd="0" destOrd="0" presId="urn:microsoft.com/office/officeart/2005/8/layout/process1"/>
-    <dgm:cxn modelId="{B59E155C-BC71-FC49-9E30-5927FF1BF084}" srcId="{FC021296-0374-4641-830E-E938FFFB89D9}" destId="{FFFD9405-5240-2D41-825B-385FD35A5E00}" srcOrd="0" destOrd="0" parTransId="{09E2FB89-A852-0447-A391-F9C032E61566}" sibTransId="{FE1AB13B-C597-F34D-A479-CE663780534F}"/>
-    <dgm:cxn modelId="{6B163B09-3B1C-4248-9FF0-27CC2E61971E}" type="presOf" srcId="{FE1AB13B-C597-F34D-A479-CE663780534F}" destId="{4025DC42-AC2E-7A49-A4DD-BBAFDA42D48F}" srcOrd="1" destOrd="0" presId="urn:microsoft.com/office/officeart/2005/8/layout/process1"/>
     <dgm:cxn modelId="{C6100422-2A66-5647-A859-1BF06D5B8B10}" type="presParOf" srcId="{A02582D2-08FC-DE4B-80BD-98FD84744CF8}" destId="{CDF89ECA-9165-1447-81C9-839A742A582C}" srcOrd="0" destOrd="0" presId="urn:microsoft.com/office/officeart/2005/8/layout/process1"/>
     <dgm:cxn modelId="{6AF8F67B-16F2-FC45-AF8C-233A99104D99}" type="presParOf" srcId="{A02582D2-08FC-DE4B-80BD-98FD84744CF8}" destId="{A98C3C44-1F70-044A-AC81-C4B2067E0E9D}" srcOrd="1" destOrd="0" presId="urn:microsoft.com/office/officeart/2005/8/layout/process1"/>
     <dgm:cxn modelId="{981EC1A6-6ED2-B645-8AC6-10C2BB2AB9FF}" type="presParOf" srcId="{A98C3C44-1F70-044A-AC81-C4B2067E0E9D}" destId="{4025DC42-AC2E-7A49-A4DD-BBAFDA42D48F}" srcOrd="0" destOrd="0" presId="urn:microsoft.com/office/officeart/2005/8/layout/process1"/>
@@ -5215,7 +5271,7 @@
   <dgm:whole/>
   <dgm:extLst>
     <a:ext uri="http://schemas.microsoft.com/office/drawing/2008/diagram">
-      <dsp:dataModelExt xmlns:dsp="http://schemas.microsoft.com/office/drawing/2008/diagram" relId="rId6" minVer="http://schemas.openxmlformats.org/drawingml/2006/diagram"/>
+      <dsp:dataModelExt xmlns:dsp="http://schemas.microsoft.com/office/drawing/2008/diagram" xmlns="" relId="rId6" minVer="http://schemas.openxmlformats.org/drawingml/2006/diagram"/>
     </a:ext>
   </dgm:extLst>
 </dgm:dataModel>
@@ -5329,10 +5385,24 @@
     <dgm:pt modelId="{A98C3C44-1F70-044A-AC81-C4B2067E0E9D}" type="pres">
       <dgm:prSet presAssocID="{FE1AB13B-C597-F34D-A479-CE663780534F}" presName="sibTrans" presStyleLbl="sibTrans2D1" presStyleIdx="0" presStyleCnt="1"/>
       <dgm:spPr/>
+      <dgm:t>
+        <a:bodyPr/>
+        <a:lstStyle/>
+        <a:p>
+          <a:endParaRPr lang="en-US"/>
+        </a:p>
+      </dgm:t>
     </dgm:pt>
     <dgm:pt modelId="{4025DC42-AC2E-7A49-A4DD-BBAFDA42D48F}" type="pres">
       <dgm:prSet presAssocID="{FE1AB13B-C597-F34D-A479-CE663780534F}" presName="connectorText" presStyleLbl="sibTrans2D1" presStyleIdx="0" presStyleCnt="1"/>
       <dgm:spPr/>
+      <dgm:t>
+        <a:bodyPr/>
+        <a:lstStyle/>
+        <a:p>
+          <a:endParaRPr lang="en-US"/>
+        </a:p>
+      </dgm:t>
     </dgm:pt>
     <dgm:pt modelId="{EB0EF557-637B-4047-B938-B5BB8807EB49}" type="pres">
       <dgm:prSet presAssocID="{EFF79344-E65E-C74B-A3E8-4C1C4FC2C637}" presName="node" presStyleLbl="node1" presStyleIdx="1" presStyleCnt="2">
@@ -5351,12 +5421,12 @@
     </dgm:pt>
   </dgm:ptLst>
   <dgm:cxnLst>
+    <dgm:cxn modelId="{748C0F5E-2D09-C343-8386-46009D091A48}" type="presOf" srcId="{FC021296-0374-4641-830E-E938FFFB89D9}" destId="{A02582D2-08FC-DE4B-80BD-98FD84744CF8}" srcOrd="0" destOrd="0" presId="urn:microsoft.com/office/officeart/2005/8/layout/process1"/>
     <dgm:cxn modelId="{B59E155C-BC71-FC49-9E30-5927FF1BF084}" srcId="{FC021296-0374-4641-830E-E938FFFB89D9}" destId="{FFFD9405-5240-2D41-825B-385FD35A5E00}" srcOrd="0" destOrd="0" parTransId="{09E2FB89-A852-0447-A391-F9C032E61566}" sibTransId="{FE1AB13B-C597-F34D-A479-CE663780534F}"/>
+    <dgm:cxn modelId="{8326A6CB-90EE-7D42-AC36-E6E9B5215779}" type="presOf" srcId="{FE1AB13B-C597-F34D-A479-CE663780534F}" destId="{A98C3C44-1F70-044A-AC81-C4B2067E0E9D}" srcOrd="0" destOrd="0" presId="urn:microsoft.com/office/officeart/2005/8/layout/process1"/>
+    <dgm:cxn modelId="{AA61FBC0-2833-9B40-9B89-767BFF650F96}" type="presOf" srcId="{FFFD9405-5240-2D41-825B-385FD35A5E00}" destId="{CDF89ECA-9165-1447-81C9-839A742A582C}" srcOrd="0" destOrd="0" presId="urn:microsoft.com/office/officeart/2005/8/layout/process1"/>
+    <dgm:cxn modelId="{DEEF75EC-899C-B949-8577-E7BF1443A110}" type="presOf" srcId="{EFF79344-E65E-C74B-A3E8-4C1C4FC2C637}" destId="{EB0EF557-637B-4047-B938-B5BB8807EB49}" srcOrd="0" destOrd="0" presId="urn:microsoft.com/office/officeart/2005/8/layout/process1"/>
     <dgm:cxn modelId="{063F5E6E-DA35-1642-AEE1-ADA65DA5BC14}" srcId="{FC021296-0374-4641-830E-E938FFFB89D9}" destId="{EFF79344-E65E-C74B-A3E8-4C1C4FC2C637}" srcOrd="1" destOrd="0" parTransId="{69CACD31-5EF7-0843-8B8D-91A92BA07B5C}" sibTransId="{DC0F101D-25BB-5940-BCE9-577389D823B2}"/>
-    <dgm:cxn modelId="{8326A6CB-90EE-7D42-AC36-E6E9B5215779}" type="presOf" srcId="{FE1AB13B-C597-F34D-A479-CE663780534F}" destId="{A98C3C44-1F70-044A-AC81-C4B2067E0E9D}" srcOrd="0" destOrd="0" presId="urn:microsoft.com/office/officeart/2005/8/layout/process1"/>
-    <dgm:cxn modelId="{DEEF75EC-899C-B949-8577-E7BF1443A110}" type="presOf" srcId="{EFF79344-E65E-C74B-A3E8-4C1C4FC2C637}" destId="{EB0EF557-637B-4047-B938-B5BB8807EB49}" srcOrd="0" destOrd="0" presId="urn:microsoft.com/office/officeart/2005/8/layout/process1"/>
-    <dgm:cxn modelId="{748C0F5E-2D09-C343-8386-46009D091A48}" type="presOf" srcId="{FC021296-0374-4641-830E-E938FFFB89D9}" destId="{A02582D2-08FC-DE4B-80BD-98FD84744CF8}" srcOrd="0" destOrd="0" presId="urn:microsoft.com/office/officeart/2005/8/layout/process1"/>
-    <dgm:cxn modelId="{AA61FBC0-2833-9B40-9B89-767BFF650F96}" type="presOf" srcId="{FFFD9405-5240-2D41-825B-385FD35A5E00}" destId="{CDF89ECA-9165-1447-81C9-839A742A582C}" srcOrd="0" destOrd="0" presId="urn:microsoft.com/office/officeart/2005/8/layout/process1"/>
     <dgm:cxn modelId="{F217E067-1B3B-9F46-A9A4-11A9FB254D4B}" type="presOf" srcId="{FE1AB13B-C597-F34D-A479-CE663780534F}" destId="{4025DC42-AC2E-7A49-A4DD-BBAFDA42D48F}" srcOrd="1" destOrd="0" presId="urn:microsoft.com/office/officeart/2005/8/layout/process1"/>
     <dgm:cxn modelId="{DC25B4DA-87C8-A848-95CF-D17FFE21B886}" type="presParOf" srcId="{A02582D2-08FC-DE4B-80BD-98FD84744CF8}" destId="{CDF89ECA-9165-1447-81C9-839A742A582C}" srcOrd="0" destOrd="0" presId="urn:microsoft.com/office/officeart/2005/8/layout/process1"/>
     <dgm:cxn modelId="{F5BA811B-01A5-E044-A5A5-09C6B3FE2AB7}" type="presParOf" srcId="{A02582D2-08FC-DE4B-80BD-98FD84744CF8}" destId="{A98C3C44-1F70-044A-AC81-C4B2067E0E9D}" srcOrd="1" destOrd="0" presId="urn:microsoft.com/office/officeart/2005/8/layout/process1"/>
@@ -5367,7 +5437,7 @@
   <dgm:whole/>
   <dgm:extLst>
     <a:ext uri="http://schemas.microsoft.com/office/drawing/2008/diagram">
-      <dsp:dataModelExt xmlns:dsp="http://schemas.microsoft.com/office/drawing/2008/diagram" relId="rId6" minVer="http://schemas.openxmlformats.org/drawingml/2006/diagram"/>
+      <dsp:dataModelExt xmlns:dsp="http://schemas.microsoft.com/office/drawing/2008/diagram" xmlns="" relId="rId6" minVer="http://schemas.openxmlformats.org/drawingml/2006/diagram"/>
     </a:ext>
   </dgm:extLst>
 </dgm:dataModel>
@@ -5487,10 +5557,24 @@
     <dgm:pt modelId="{A98C3C44-1F70-044A-AC81-C4B2067E0E9D}" type="pres">
       <dgm:prSet presAssocID="{FE1AB13B-C597-F34D-A479-CE663780534F}" presName="sibTrans" presStyleLbl="sibTrans2D1" presStyleIdx="0" presStyleCnt="1"/>
       <dgm:spPr/>
+      <dgm:t>
+        <a:bodyPr/>
+        <a:lstStyle/>
+        <a:p>
+          <a:endParaRPr lang="en-US"/>
+        </a:p>
+      </dgm:t>
     </dgm:pt>
     <dgm:pt modelId="{4025DC42-AC2E-7A49-A4DD-BBAFDA42D48F}" type="pres">
       <dgm:prSet presAssocID="{FE1AB13B-C597-F34D-A479-CE663780534F}" presName="connectorText" presStyleLbl="sibTrans2D1" presStyleIdx="0" presStyleCnt="1"/>
       <dgm:spPr/>
+      <dgm:t>
+        <a:bodyPr/>
+        <a:lstStyle/>
+        <a:p>
+          <a:endParaRPr lang="en-US"/>
+        </a:p>
+      </dgm:t>
     </dgm:pt>
     <dgm:pt modelId="{EB0EF557-637B-4047-B938-B5BB8807EB49}" type="pres">
       <dgm:prSet presAssocID="{EFF79344-E65E-C74B-A3E8-4C1C4FC2C637}" presName="node" presStyleLbl="node1" presStyleIdx="1" presStyleCnt="2">
@@ -5509,13 +5593,13 @@
     </dgm:pt>
   </dgm:ptLst>
   <dgm:cxnLst>
+    <dgm:cxn modelId="{B59E155C-BC71-FC49-9E30-5927FF1BF084}" srcId="{FC021296-0374-4641-830E-E938FFFB89D9}" destId="{FFFD9405-5240-2D41-825B-385FD35A5E00}" srcOrd="0" destOrd="0" parTransId="{09E2FB89-A852-0447-A391-F9C032E61566}" sibTransId="{FE1AB13B-C597-F34D-A479-CE663780534F}"/>
+    <dgm:cxn modelId="{DFFA26C3-E0E9-B84C-BB66-7E644FBAAEB4}" type="presOf" srcId="{FC021296-0374-4641-830E-E938FFFB89D9}" destId="{A02582D2-08FC-DE4B-80BD-98FD84744CF8}" srcOrd="0" destOrd="0" presId="urn:microsoft.com/office/officeart/2005/8/layout/process1"/>
+    <dgm:cxn modelId="{65E7A1BD-4EA3-6742-9F7A-43E8B159671C}" type="presOf" srcId="{EFF79344-E65E-C74B-A3E8-4C1C4FC2C637}" destId="{EB0EF557-637B-4047-B938-B5BB8807EB49}" srcOrd="0" destOrd="0" presId="urn:microsoft.com/office/officeart/2005/8/layout/process1"/>
+    <dgm:cxn modelId="{2BEA3905-8E82-BD4B-8BC2-448666E8AC58}" type="presOf" srcId="{FE1AB13B-C597-F34D-A479-CE663780534F}" destId="{4025DC42-AC2E-7A49-A4DD-BBAFDA42D48F}" srcOrd="1" destOrd="0" presId="urn:microsoft.com/office/officeart/2005/8/layout/process1"/>
+    <dgm:cxn modelId="{B2D2F4C9-69F3-0045-A88C-A53540EBD114}" type="presOf" srcId="{FFFD9405-5240-2D41-825B-385FD35A5E00}" destId="{CDF89ECA-9165-1447-81C9-839A742A582C}" srcOrd="0" destOrd="0" presId="urn:microsoft.com/office/officeart/2005/8/layout/process1"/>
+    <dgm:cxn modelId="{063F5E6E-DA35-1642-AEE1-ADA65DA5BC14}" srcId="{FC021296-0374-4641-830E-E938FFFB89D9}" destId="{EFF79344-E65E-C74B-A3E8-4C1C4FC2C637}" srcOrd="1" destOrd="0" parTransId="{69CACD31-5EF7-0843-8B8D-91A92BA07B5C}" sibTransId="{DC0F101D-25BB-5940-BCE9-577389D823B2}"/>
     <dgm:cxn modelId="{5FC817A2-3EFD-5949-8A3E-E63C94CF136A}" type="presOf" srcId="{FE1AB13B-C597-F34D-A479-CE663780534F}" destId="{A98C3C44-1F70-044A-AC81-C4B2067E0E9D}" srcOrd="0" destOrd="0" presId="urn:microsoft.com/office/officeart/2005/8/layout/process1"/>
-    <dgm:cxn modelId="{B59E155C-BC71-FC49-9E30-5927FF1BF084}" srcId="{FC021296-0374-4641-830E-E938FFFB89D9}" destId="{FFFD9405-5240-2D41-825B-385FD35A5E00}" srcOrd="0" destOrd="0" parTransId="{09E2FB89-A852-0447-A391-F9C032E61566}" sibTransId="{FE1AB13B-C597-F34D-A479-CE663780534F}"/>
-    <dgm:cxn modelId="{063F5E6E-DA35-1642-AEE1-ADA65DA5BC14}" srcId="{FC021296-0374-4641-830E-E938FFFB89D9}" destId="{EFF79344-E65E-C74B-A3E8-4C1C4FC2C637}" srcOrd="1" destOrd="0" parTransId="{69CACD31-5EF7-0843-8B8D-91A92BA07B5C}" sibTransId="{DC0F101D-25BB-5940-BCE9-577389D823B2}"/>
-    <dgm:cxn modelId="{2BEA3905-8E82-BD4B-8BC2-448666E8AC58}" type="presOf" srcId="{FE1AB13B-C597-F34D-A479-CE663780534F}" destId="{4025DC42-AC2E-7A49-A4DD-BBAFDA42D48F}" srcOrd="1" destOrd="0" presId="urn:microsoft.com/office/officeart/2005/8/layout/process1"/>
-    <dgm:cxn modelId="{65E7A1BD-4EA3-6742-9F7A-43E8B159671C}" type="presOf" srcId="{EFF79344-E65E-C74B-A3E8-4C1C4FC2C637}" destId="{EB0EF557-637B-4047-B938-B5BB8807EB49}" srcOrd="0" destOrd="0" presId="urn:microsoft.com/office/officeart/2005/8/layout/process1"/>
-    <dgm:cxn modelId="{B2D2F4C9-69F3-0045-A88C-A53540EBD114}" type="presOf" srcId="{FFFD9405-5240-2D41-825B-385FD35A5E00}" destId="{CDF89ECA-9165-1447-81C9-839A742A582C}" srcOrd="0" destOrd="0" presId="urn:microsoft.com/office/officeart/2005/8/layout/process1"/>
-    <dgm:cxn modelId="{DFFA26C3-E0E9-B84C-BB66-7E644FBAAEB4}" type="presOf" srcId="{FC021296-0374-4641-830E-E938FFFB89D9}" destId="{A02582D2-08FC-DE4B-80BD-98FD84744CF8}" srcOrd="0" destOrd="0" presId="urn:microsoft.com/office/officeart/2005/8/layout/process1"/>
     <dgm:cxn modelId="{7EDFB75E-6D32-FE47-ADE2-FBDA36E46268}" type="presParOf" srcId="{A02582D2-08FC-DE4B-80BD-98FD84744CF8}" destId="{CDF89ECA-9165-1447-81C9-839A742A582C}" srcOrd="0" destOrd="0" presId="urn:microsoft.com/office/officeart/2005/8/layout/process1"/>
     <dgm:cxn modelId="{7BA38D9D-7A62-3743-BFBF-828019ADE80B}" type="presParOf" srcId="{A02582D2-08FC-DE4B-80BD-98FD84744CF8}" destId="{A98C3C44-1F70-044A-AC81-C4B2067E0E9D}" srcOrd="1" destOrd="0" presId="urn:microsoft.com/office/officeart/2005/8/layout/process1"/>
     <dgm:cxn modelId="{E54BF7B8-BC7B-FA40-88DC-A1A8B089FC49}" type="presParOf" srcId="{A98C3C44-1F70-044A-AC81-C4B2067E0E9D}" destId="{4025DC42-AC2E-7A49-A4DD-BBAFDA42D48F}" srcOrd="0" destOrd="0" presId="urn:microsoft.com/office/officeart/2005/8/layout/process1"/>
@@ -5525,14 +5609,14 @@
   <dgm:whole/>
   <dgm:extLst>
     <a:ext uri="http://schemas.microsoft.com/office/drawing/2008/diagram">
-      <dsp:dataModelExt xmlns:dsp="http://schemas.microsoft.com/office/drawing/2008/diagram" relId="rId6" minVer="http://schemas.openxmlformats.org/drawingml/2006/diagram"/>
+      <dsp:dataModelExt xmlns:dsp="http://schemas.microsoft.com/office/drawing/2008/diagram" xmlns="" relId="rId6" minVer="http://schemas.openxmlformats.org/drawingml/2006/diagram"/>
     </a:ext>
   </dgm:extLst>
 </dgm:dataModel>
 </file>
 
 <file path=ppt/diagrams/drawing1.xml><?xml version="1.0" encoding="utf-8"?>
-<dsp:drawing xmlns:dgm="http://schemas.openxmlformats.org/drawingml/2006/diagram" xmlns:dsp="http://schemas.microsoft.com/office/drawing/2008/diagram" xmlns:a="http://schemas.openxmlformats.org/drawingml/2006/main">
+<dsp:drawing xmlns:dgm="http://schemas.openxmlformats.org/drawingml/2006/diagram" xmlns:a="http://schemas.openxmlformats.org/drawingml/2006/main" xmlns:dsp="http://schemas.microsoft.com/office/drawing/2008/diagram">
   <dsp:spTree>
     <dsp:nvGrpSpPr>
       <dsp:cNvPr id="0" name=""/>
@@ -5636,8 +5720,8 @@
         </a:p>
       </dsp:txBody>
       <dsp:txXfrm>
-        <a:off x="61079" y="824997"/>
-        <a:ext cx="3266359" cy="1912222"/>
+        <a:off x="1587" y="765505"/>
+        <a:ext cx="3385343" cy="2031206"/>
       </dsp:txXfrm>
     </dsp:sp>
     <dsp:sp modelId="{A98C3C44-1F70-044A-AC81-C4B2067E0E9D}">
@@ -5737,8 +5821,8 @@
         </a:p>
       </dsp:txBody>
       <dsp:txXfrm>
-        <a:off x="3725465" y="1529238"/>
-        <a:ext cx="502384" cy="503739"/>
+        <a:off x="3725465" y="1361325"/>
+        <a:ext cx="717692" cy="839565"/>
       </dsp:txXfrm>
     </dsp:sp>
     <dsp:sp modelId="{EB0EF557-637B-4047-B938-B5BB8807EB49}">
@@ -5838,8 +5922,8 @@
         </a:p>
       </dsp:txBody>
       <dsp:txXfrm>
-        <a:off x="4800560" y="824997"/>
-        <a:ext cx="3266359" cy="1912222"/>
+        <a:off x="4741068" y="765505"/>
+        <a:ext cx="3385343" cy="2031206"/>
       </dsp:txXfrm>
     </dsp:sp>
   </dsp:spTree>
@@ -5847,7 +5931,7 @@
 </file>
 
 <file path=ppt/diagrams/drawing2.xml><?xml version="1.0" encoding="utf-8"?>
-<dsp:drawing xmlns:dgm="http://schemas.openxmlformats.org/drawingml/2006/diagram" xmlns:dsp="http://schemas.microsoft.com/office/drawing/2008/diagram" xmlns:a="http://schemas.openxmlformats.org/drawingml/2006/main">
+<dsp:drawing xmlns:dgm="http://schemas.openxmlformats.org/drawingml/2006/diagram" xmlns:a="http://schemas.openxmlformats.org/drawingml/2006/main" xmlns:dsp="http://schemas.microsoft.com/office/drawing/2008/diagram">
   <dsp:spTree>
     <dsp:nvGrpSpPr>
       <dsp:cNvPr id="0" name=""/>
@@ -5951,8 +6035,8 @@
         </a:p>
       </dsp:txBody>
       <dsp:txXfrm>
-        <a:off x="61079" y="824997"/>
-        <a:ext cx="3266359" cy="1912222"/>
+        <a:off x="1587" y="765505"/>
+        <a:ext cx="3385343" cy="2031206"/>
       </dsp:txXfrm>
     </dsp:sp>
     <dsp:sp modelId="{A98C3C44-1F70-044A-AC81-C4B2067E0E9D}">
@@ -6052,8 +6136,8 @@
         </a:p>
       </dsp:txBody>
       <dsp:txXfrm>
-        <a:off x="3725465" y="1529238"/>
-        <a:ext cx="502384" cy="503739"/>
+        <a:off x="3725465" y="1361325"/>
+        <a:ext cx="717692" cy="839565"/>
       </dsp:txXfrm>
     </dsp:sp>
     <dsp:sp modelId="{EB0EF557-637B-4047-B938-B5BB8807EB49}">
@@ -6153,8 +6237,8 @@
         </a:p>
       </dsp:txBody>
       <dsp:txXfrm>
-        <a:off x="4800560" y="824997"/>
-        <a:ext cx="3266359" cy="1912222"/>
+        <a:off x="4741068" y="765505"/>
+        <a:ext cx="3385343" cy="2031206"/>
       </dsp:txXfrm>
     </dsp:sp>
   </dsp:spTree>
@@ -6162,7 +6246,7 @@
 </file>
 
 <file path=ppt/diagrams/drawing3.xml><?xml version="1.0" encoding="utf-8"?>
-<dsp:drawing xmlns:dgm="http://schemas.openxmlformats.org/drawingml/2006/diagram" xmlns:dsp="http://schemas.microsoft.com/office/drawing/2008/diagram" xmlns:a="http://schemas.openxmlformats.org/drawingml/2006/main">
+<dsp:drawing xmlns:dgm="http://schemas.openxmlformats.org/drawingml/2006/diagram" xmlns:a="http://schemas.openxmlformats.org/drawingml/2006/main" xmlns:dsp="http://schemas.microsoft.com/office/drawing/2008/diagram">
   <dsp:spTree>
     <dsp:nvGrpSpPr>
       <dsp:cNvPr id="0" name=""/>
@@ -6266,8 +6350,8 @@
         </a:p>
       </dsp:txBody>
       <dsp:txXfrm>
-        <a:off x="61079" y="604279"/>
-        <a:ext cx="3266359" cy="1912222"/>
+        <a:off x="1587" y="544787"/>
+        <a:ext cx="3385343" cy="2031206"/>
       </dsp:txXfrm>
     </dsp:sp>
     <dsp:sp modelId="{A98C3C44-1F70-044A-AC81-C4B2067E0E9D}">
@@ -6367,8 +6451,8 @@
         </a:p>
       </dsp:txBody>
       <dsp:txXfrm>
-        <a:off x="3725465" y="1308521"/>
-        <a:ext cx="502384" cy="503739"/>
+        <a:off x="3725465" y="1140608"/>
+        <a:ext cx="717692" cy="839565"/>
       </dsp:txXfrm>
     </dsp:sp>
     <dsp:sp modelId="{EB0EF557-637B-4047-B938-B5BB8807EB49}">
@@ -6476,8 +6560,8 @@
         </a:p>
       </dsp:txBody>
       <dsp:txXfrm>
-        <a:off x="4800560" y="604279"/>
-        <a:ext cx="3266359" cy="1912222"/>
+        <a:off x="4741068" y="544787"/>
+        <a:ext cx="3385343" cy="2031206"/>
       </dsp:txXfrm>
     </dsp:sp>
   </dsp:spTree>
@@ -6485,7 +6569,7 @@
 </file>
 
 <file path=ppt/diagrams/drawing4.xml><?xml version="1.0" encoding="utf-8"?>
-<dsp:drawing xmlns:dgm="http://schemas.openxmlformats.org/drawingml/2006/diagram" xmlns:dsp="http://schemas.microsoft.com/office/drawing/2008/diagram" xmlns:a="http://schemas.openxmlformats.org/drawingml/2006/main">
+<dsp:drawing xmlns:dgm="http://schemas.openxmlformats.org/drawingml/2006/diagram" xmlns:a="http://schemas.openxmlformats.org/drawingml/2006/main" xmlns:dsp="http://schemas.microsoft.com/office/drawing/2008/diagram">
   <dsp:spTree>
     <dsp:nvGrpSpPr>
       <dsp:cNvPr id="0" name=""/>
@@ -6589,8 +6673,8 @@
         </a:p>
       </dsp:txBody>
       <dsp:txXfrm>
-        <a:off x="61079" y="604279"/>
-        <a:ext cx="3266359" cy="1912222"/>
+        <a:off x="1587" y="544787"/>
+        <a:ext cx="3385343" cy="2031206"/>
       </dsp:txXfrm>
     </dsp:sp>
     <dsp:sp modelId="{A98C3C44-1F70-044A-AC81-C4B2067E0E9D}">
@@ -6690,8 +6774,8 @@
         </a:p>
       </dsp:txBody>
       <dsp:txXfrm>
-        <a:off x="3725465" y="1308521"/>
-        <a:ext cx="502384" cy="503739"/>
+        <a:off x="3725465" y="1140608"/>
+        <a:ext cx="717692" cy="839565"/>
       </dsp:txXfrm>
     </dsp:sp>
     <dsp:sp modelId="{EB0EF557-637B-4047-B938-B5BB8807EB49}">
@@ -6795,8 +6879,8 @@
         </a:p>
       </dsp:txBody>
       <dsp:txXfrm>
-        <a:off x="4800560" y="604279"/>
-        <a:ext cx="3266359" cy="1912222"/>
+        <a:off x="4741068" y="544787"/>
+        <a:ext cx="3385343" cy="2031206"/>
       </dsp:txXfrm>
     </dsp:sp>
   </dsp:spTree>
@@ -6804,7 +6888,7 @@
 </file>
 
 <file path=ppt/diagrams/drawing5.xml><?xml version="1.0" encoding="utf-8"?>
-<dsp:drawing xmlns:dgm="http://schemas.openxmlformats.org/drawingml/2006/diagram" xmlns:dsp="http://schemas.microsoft.com/office/drawing/2008/diagram" xmlns:a="http://schemas.openxmlformats.org/drawingml/2006/main">
+<dsp:drawing xmlns:dgm="http://schemas.openxmlformats.org/drawingml/2006/diagram" xmlns:a="http://schemas.openxmlformats.org/drawingml/2006/main" xmlns:dsp="http://schemas.microsoft.com/office/drawing/2008/diagram">
   <dsp:spTree>
     <dsp:nvGrpSpPr>
       <dsp:cNvPr id="0" name=""/>
@@ -6908,8 +6992,8 @@
         </a:p>
       </dsp:txBody>
       <dsp:txXfrm>
-        <a:off x="61079" y="1198655"/>
-        <a:ext cx="3266359" cy="1912222"/>
+        <a:off x="1587" y="1139163"/>
+        <a:ext cx="3385343" cy="2031206"/>
       </dsp:txXfrm>
     </dsp:sp>
     <dsp:sp modelId="{A98C3C44-1F70-044A-AC81-C4B2067E0E9D}">
@@ -7009,8 +7093,8 @@
         </a:p>
       </dsp:txBody>
       <dsp:txXfrm>
-        <a:off x="3725465" y="1902896"/>
-        <a:ext cx="502384" cy="503739"/>
+        <a:off x="3725465" y="1734983"/>
+        <a:ext cx="717692" cy="839565"/>
       </dsp:txXfrm>
     </dsp:sp>
     <dsp:sp modelId="{EB0EF557-637B-4047-B938-B5BB8807EB49}">
@@ -7110,8 +7194,8 @@
         </a:p>
       </dsp:txBody>
       <dsp:txXfrm>
-        <a:off x="4800560" y="1198655"/>
-        <a:ext cx="3266359" cy="1912222"/>
+        <a:off x="4741068" y="1139163"/>
+        <a:ext cx="3385343" cy="2031206"/>
       </dsp:txXfrm>
     </dsp:sp>
   </dsp:spTree>
@@ -7119,7 +7203,7 @@
 </file>
 
 <file path=ppt/diagrams/drawing6.xml><?xml version="1.0" encoding="utf-8"?>
-<dsp:drawing xmlns:dgm="http://schemas.openxmlformats.org/drawingml/2006/diagram" xmlns:dsp="http://schemas.microsoft.com/office/drawing/2008/diagram" xmlns:a="http://schemas.openxmlformats.org/drawingml/2006/main">
+<dsp:drawing xmlns:dgm="http://schemas.openxmlformats.org/drawingml/2006/diagram" xmlns:a="http://schemas.openxmlformats.org/drawingml/2006/main" xmlns:dsp="http://schemas.microsoft.com/office/drawing/2008/diagram">
   <dsp:spTree>
     <dsp:nvGrpSpPr>
       <dsp:cNvPr id="0" name=""/>
@@ -7223,8 +7307,8 @@
         </a:p>
       </dsp:txBody>
       <dsp:txXfrm>
-        <a:off x="61079" y="1198655"/>
-        <a:ext cx="3266359" cy="1912222"/>
+        <a:off x="1587" y="1139163"/>
+        <a:ext cx="3385343" cy="2031206"/>
       </dsp:txXfrm>
     </dsp:sp>
     <dsp:sp modelId="{A98C3C44-1F70-044A-AC81-C4B2067E0E9D}">
@@ -7324,8 +7408,8 @@
         </a:p>
       </dsp:txBody>
       <dsp:txXfrm>
-        <a:off x="3725465" y="1902896"/>
-        <a:ext cx="502384" cy="503739"/>
+        <a:off x="3725465" y="1734983"/>
+        <a:ext cx="717692" cy="839565"/>
       </dsp:txXfrm>
     </dsp:sp>
     <dsp:sp modelId="{EB0EF557-637B-4047-B938-B5BB8807EB49}">
@@ -7442,8 +7526,8 @@
         </a:p>
       </dsp:txBody>
       <dsp:txXfrm>
-        <a:off x="4800560" y="1198655"/>
-        <a:ext cx="3266359" cy="1912222"/>
+        <a:off x="4741068" y="1139163"/>
+        <a:ext cx="3385343" cy="2031206"/>
       </dsp:txXfrm>
     </dsp:sp>
   </dsp:spTree>
@@ -14661,7 +14745,8 @@
           <a:p>
             <a:fld id="{FA24516E-3BC4-C249-8A72-574E9AE78B76}" type="datetimeFigureOut">
               <a:rPr lang="en-US" smtClean="0"/>
-              <a:t>6/5/17</a:t>
+              <a:pPr/>
+              <a:t>6/12/2017</a:t>
             </a:fld>
             <a:endParaRPr lang="en-US"/>
           </a:p>
@@ -14703,6 +14788,7 @@
           <a:p>
             <a:fld id="{AD482827-2955-1F48-A43E-46DEB6DC31E0}" type="slidenum">
               <a:rPr lang="en-US" smtClean="0"/>
+              <a:pPr/>
               <a:t>‹#›</a:t>
             </a:fld>
             <a:endParaRPr lang="en-US"/>
@@ -14712,7 +14798,7 @@
     </p:spTree>
     <p:extLst>
       <p:ext uri="{BB962C8B-B14F-4D97-AF65-F5344CB8AC3E}">
-        <p14:creationId xmlns:p14="http://schemas.microsoft.com/office/powerpoint/2010/main" val="1384051197"/>
+        <p14:creationId xmlns:p14="http://schemas.microsoft.com/office/powerpoint/2010/main" xmlns="" val="1384051197"/>
       </p:ext>
     </p:extLst>
   </p:cSld>
@@ -14831,7 +14917,8 @@
           <a:p>
             <a:fld id="{FA24516E-3BC4-C249-8A72-574E9AE78B76}" type="datetimeFigureOut">
               <a:rPr lang="en-US" smtClean="0"/>
-              <a:t>6/5/17</a:t>
+              <a:pPr/>
+              <a:t>6/12/2017</a:t>
             </a:fld>
             <a:endParaRPr lang="en-US"/>
           </a:p>
@@ -14873,6 +14960,7 @@
           <a:p>
             <a:fld id="{AD482827-2955-1F48-A43E-46DEB6DC31E0}" type="slidenum">
               <a:rPr lang="en-US" smtClean="0"/>
+              <a:pPr/>
               <a:t>‹#›</a:t>
             </a:fld>
             <a:endParaRPr lang="en-US"/>
@@ -14882,7 +14970,7 @@
     </p:spTree>
     <p:extLst>
       <p:ext uri="{BB962C8B-B14F-4D97-AF65-F5344CB8AC3E}">
-        <p14:creationId xmlns:p14="http://schemas.microsoft.com/office/powerpoint/2010/main" val="449548070"/>
+        <p14:creationId xmlns:p14="http://schemas.microsoft.com/office/powerpoint/2010/main" xmlns="" val="449548070"/>
       </p:ext>
     </p:extLst>
   </p:cSld>
@@ -15011,7 +15099,8 @@
           <a:p>
             <a:fld id="{FA24516E-3BC4-C249-8A72-574E9AE78B76}" type="datetimeFigureOut">
               <a:rPr lang="en-US" smtClean="0"/>
-              <a:t>6/5/17</a:t>
+              <a:pPr/>
+              <a:t>6/12/2017</a:t>
             </a:fld>
             <a:endParaRPr lang="en-US"/>
           </a:p>
@@ -15053,6 +15142,7 @@
           <a:p>
             <a:fld id="{AD482827-2955-1F48-A43E-46DEB6DC31E0}" type="slidenum">
               <a:rPr lang="en-US" smtClean="0"/>
+              <a:pPr/>
               <a:t>‹#›</a:t>
             </a:fld>
             <a:endParaRPr lang="en-US"/>
@@ -15062,7 +15152,7 @@
     </p:spTree>
     <p:extLst>
       <p:ext uri="{BB962C8B-B14F-4D97-AF65-F5344CB8AC3E}">
-        <p14:creationId xmlns:p14="http://schemas.microsoft.com/office/powerpoint/2010/main" val="706942344"/>
+        <p14:creationId xmlns:p14="http://schemas.microsoft.com/office/powerpoint/2010/main" xmlns="" val="706942344"/>
       </p:ext>
     </p:extLst>
   </p:cSld>
@@ -15181,7 +15271,8 @@
           <a:p>
             <a:fld id="{FA24516E-3BC4-C249-8A72-574E9AE78B76}" type="datetimeFigureOut">
               <a:rPr lang="en-US" smtClean="0"/>
-              <a:t>6/5/17</a:t>
+              <a:pPr/>
+              <a:t>6/12/2017</a:t>
             </a:fld>
             <a:endParaRPr lang="en-US"/>
           </a:p>
@@ -15223,6 +15314,7 @@
           <a:p>
             <a:fld id="{AD482827-2955-1F48-A43E-46DEB6DC31E0}" type="slidenum">
               <a:rPr lang="en-US" smtClean="0"/>
+              <a:pPr/>
               <a:t>‹#›</a:t>
             </a:fld>
             <a:endParaRPr lang="en-US"/>
@@ -15232,7 +15324,7 @@
     </p:spTree>
     <p:extLst>
       <p:ext uri="{BB962C8B-B14F-4D97-AF65-F5344CB8AC3E}">
-        <p14:creationId xmlns:p14="http://schemas.microsoft.com/office/powerpoint/2010/main" val="1156650173"/>
+        <p14:creationId xmlns:p14="http://schemas.microsoft.com/office/powerpoint/2010/main" xmlns="" val="1156650173"/>
       </p:ext>
     </p:extLst>
   </p:cSld>
@@ -15427,7 +15519,8 @@
           <a:p>
             <a:fld id="{FA24516E-3BC4-C249-8A72-574E9AE78B76}" type="datetimeFigureOut">
               <a:rPr lang="en-US" smtClean="0"/>
-              <a:t>6/5/17</a:t>
+              <a:pPr/>
+              <a:t>6/12/2017</a:t>
             </a:fld>
             <a:endParaRPr lang="en-US"/>
           </a:p>
@@ -15469,6 +15562,7 @@
           <a:p>
             <a:fld id="{AD482827-2955-1F48-A43E-46DEB6DC31E0}" type="slidenum">
               <a:rPr lang="en-US" smtClean="0"/>
+              <a:pPr/>
               <a:t>‹#›</a:t>
             </a:fld>
             <a:endParaRPr lang="en-US"/>
@@ -15478,7 +15572,7 @@
     </p:spTree>
     <p:extLst>
       <p:ext uri="{BB962C8B-B14F-4D97-AF65-F5344CB8AC3E}">
-        <p14:creationId xmlns:p14="http://schemas.microsoft.com/office/powerpoint/2010/main" val="797484967"/>
+        <p14:creationId xmlns:p14="http://schemas.microsoft.com/office/powerpoint/2010/main" xmlns="" val="797484967"/>
       </p:ext>
     </p:extLst>
   </p:cSld>
@@ -15659,7 +15753,8 @@
           <a:p>
             <a:fld id="{FA24516E-3BC4-C249-8A72-574E9AE78B76}" type="datetimeFigureOut">
               <a:rPr lang="en-US" smtClean="0"/>
-              <a:t>6/5/17</a:t>
+              <a:pPr/>
+              <a:t>6/12/2017</a:t>
             </a:fld>
             <a:endParaRPr lang="en-US"/>
           </a:p>
@@ -15701,6 +15796,7 @@
           <a:p>
             <a:fld id="{AD482827-2955-1F48-A43E-46DEB6DC31E0}" type="slidenum">
               <a:rPr lang="en-US" smtClean="0"/>
+              <a:pPr/>
               <a:t>‹#›</a:t>
             </a:fld>
             <a:endParaRPr lang="en-US"/>
@@ -15710,7 +15806,7 @@
     </p:spTree>
     <p:extLst>
       <p:ext uri="{BB962C8B-B14F-4D97-AF65-F5344CB8AC3E}">
-        <p14:creationId xmlns:p14="http://schemas.microsoft.com/office/powerpoint/2010/main" val="884399442"/>
+        <p14:creationId xmlns:p14="http://schemas.microsoft.com/office/powerpoint/2010/main" xmlns="" val="884399442"/>
       </p:ext>
     </p:extLst>
   </p:cSld>
@@ -16026,7 +16122,8 @@
           <a:p>
             <a:fld id="{FA24516E-3BC4-C249-8A72-574E9AE78B76}" type="datetimeFigureOut">
               <a:rPr lang="en-US" smtClean="0"/>
-              <a:t>6/5/17</a:t>
+              <a:pPr/>
+              <a:t>6/12/2017</a:t>
             </a:fld>
             <a:endParaRPr lang="en-US"/>
           </a:p>
@@ -16068,6 +16165,7 @@
           <a:p>
             <a:fld id="{AD482827-2955-1F48-A43E-46DEB6DC31E0}" type="slidenum">
               <a:rPr lang="en-US" smtClean="0"/>
+              <a:pPr/>
               <a:t>‹#›</a:t>
             </a:fld>
             <a:endParaRPr lang="en-US"/>
@@ -16077,7 +16175,7 @@
     </p:spTree>
     <p:extLst>
       <p:ext uri="{BB962C8B-B14F-4D97-AF65-F5344CB8AC3E}">
-        <p14:creationId xmlns:p14="http://schemas.microsoft.com/office/powerpoint/2010/main" val="1367100807"/>
+        <p14:creationId xmlns:p14="http://schemas.microsoft.com/office/powerpoint/2010/main" xmlns="" val="1367100807"/>
       </p:ext>
     </p:extLst>
   </p:cSld>
@@ -16144,7 +16242,8 @@
           <a:p>
             <a:fld id="{FA24516E-3BC4-C249-8A72-574E9AE78B76}" type="datetimeFigureOut">
               <a:rPr lang="en-US" smtClean="0"/>
-              <a:t>6/5/17</a:t>
+              <a:pPr/>
+              <a:t>6/12/2017</a:t>
             </a:fld>
             <a:endParaRPr lang="en-US"/>
           </a:p>
@@ -16186,6 +16285,7 @@
           <a:p>
             <a:fld id="{AD482827-2955-1F48-A43E-46DEB6DC31E0}" type="slidenum">
               <a:rPr lang="en-US" smtClean="0"/>
+              <a:pPr/>
               <a:t>‹#›</a:t>
             </a:fld>
             <a:endParaRPr lang="en-US"/>
@@ -16195,7 +16295,7 @@
     </p:spTree>
     <p:extLst>
       <p:ext uri="{BB962C8B-B14F-4D97-AF65-F5344CB8AC3E}">
-        <p14:creationId xmlns:p14="http://schemas.microsoft.com/office/powerpoint/2010/main" val="935723996"/>
+        <p14:creationId xmlns:p14="http://schemas.microsoft.com/office/powerpoint/2010/main" xmlns="" val="935723996"/>
       </p:ext>
     </p:extLst>
   </p:cSld>
@@ -16239,7 +16339,8 @@
           <a:p>
             <a:fld id="{FA24516E-3BC4-C249-8A72-574E9AE78B76}" type="datetimeFigureOut">
               <a:rPr lang="en-US" smtClean="0"/>
-              <a:t>6/5/17</a:t>
+              <a:pPr/>
+              <a:t>6/12/2017</a:t>
             </a:fld>
             <a:endParaRPr lang="en-US"/>
           </a:p>
@@ -16281,6 +16382,7 @@
           <a:p>
             <a:fld id="{AD482827-2955-1F48-A43E-46DEB6DC31E0}" type="slidenum">
               <a:rPr lang="en-US" smtClean="0"/>
+              <a:pPr/>
               <a:t>‹#›</a:t>
             </a:fld>
             <a:endParaRPr lang="en-US"/>
@@ -16290,7 +16392,7 @@
     </p:spTree>
     <p:extLst>
       <p:ext uri="{BB962C8B-B14F-4D97-AF65-F5344CB8AC3E}">
-        <p14:creationId xmlns:p14="http://schemas.microsoft.com/office/powerpoint/2010/main" val="690453791"/>
+        <p14:creationId xmlns:p14="http://schemas.microsoft.com/office/powerpoint/2010/main" xmlns="" val="690453791"/>
       </p:ext>
     </p:extLst>
   </p:cSld>
@@ -16516,7 +16618,8 @@
           <a:p>
             <a:fld id="{FA24516E-3BC4-C249-8A72-574E9AE78B76}" type="datetimeFigureOut">
               <a:rPr lang="en-US" smtClean="0"/>
-              <a:t>6/5/17</a:t>
+              <a:pPr/>
+              <a:t>6/12/2017</a:t>
             </a:fld>
             <a:endParaRPr lang="en-US"/>
           </a:p>
@@ -16558,6 +16661,7 @@
           <a:p>
             <a:fld id="{AD482827-2955-1F48-A43E-46DEB6DC31E0}" type="slidenum">
               <a:rPr lang="en-US" smtClean="0"/>
+              <a:pPr/>
               <a:t>‹#›</a:t>
             </a:fld>
             <a:endParaRPr lang="en-US"/>
@@ -16567,7 +16671,7 @@
     </p:spTree>
     <p:extLst>
       <p:ext uri="{BB962C8B-B14F-4D97-AF65-F5344CB8AC3E}">
-        <p14:creationId xmlns:p14="http://schemas.microsoft.com/office/powerpoint/2010/main" val="1602720596"/>
+        <p14:creationId xmlns:p14="http://schemas.microsoft.com/office/powerpoint/2010/main" xmlns="" val="1602720596"/>
       </p:ext>
     </p:extLst>
   </p:cSld>
@@ -16769,7 +16873,8 @@
           <a:p>
             <a:fld id="{FA24516E-3BC4-C249-8A72-574E9AE78B76}" type="datetimeFigureOut">
               <a:rPr lang="en-US" smtClean="0"/>
-              <a:t>6/5/17</a:t>
+              <a:pPr/>
+              <a:t>6/12/2017</a:t>
             </a:fld>
             <a:endParaRPr lang="en-US"/>
           </a:p>
@@ -16811,6 +16916,7 @@
           <a:p>
             <a:fld id="{AD482827-2955-1F48-A43E-46DEB6DC31E0}" type="slidenum">
               <a:rPr lang="en-US" smtClean="0"/>
+              <a:pPr/>
               <a:t>‹#›</a:t>
             </a:fld>
             <a:endParaRPr lang="en-US"/>
@@ -16820,7 +16926,7 @@
     </p:spTree>
     <p:extLst>
       <p:ext uri="{BB962C8B-B14F-4D97-AF65-F5344CB8AC3E}">
-        <p14:creationId xmlns:p14="http://schemas.microsoft.com/office/powerpoint/2010/main" val="1037672651"/>
+        <p14:creationId xmlns:p14="http://schemas.microsoft.com/office/powerpoint/2010/main" xmlns="" val="1037672651"/>
       </p:ext>
     </p:extLst>
   </p:cSld>
@@ -16982,7 +17088,8 @@
           <a:p>
             <a:fld id="{FA24516E-3BC4-C249-8A72-574E9AE78B76}" type="datetimeFigureOut">
               <a:rPr lang="en-US" smtClean="0"/>
-              <a:t>6/5/17</a:t>
+              <a:pPr/>
+              <a:t>6/12/2017</a:t>
             </a:fld>
             <a:endParaRPr lang="en-US"/>
           </a:p>
@@ -17060,6 +17167,7 @@
           <a:p>
             <a:fld id="{AD482827-2955-1F48-A43E-46DEB6DC31E0}" type="slidenum">
               <a:rPr lang="en-US" smtClean="0"/>
+              <a:pPr/>
               <a:t>‹#›</a:t>
             </a:fld>
             <a:endParaRPr lang="en-US"/>
@@ -17069,7 +17177,7 @@
     </p:spTree>
     <p:extLst>
       <p:ext uri="{BB962C8B-B14F-4D97-AF65-F5344CB8AC3E}">
-        <p14:creationId xmlns:p14="http://schemas.microsoft.com/office/powerpoint/2010/main" val="1406481618"/>
+        <p14:creationId xmlns:p14="http://schemas.microsoft.com/office/powerpoint/2010/main" xmlns="" val="1406481618"/>
       </p:ext>
     </p:extLst>
   </p:cSld>
@@ -17418,7 +17526,7 @@
     </p:spTree>
     <p:extLst>
       <p:ext uri="{BB962C8B-B14F-4D97-AF65-F5344CB8AC3E}">
-        <p14:creationId xmlns:p14="http://schemas.microsoft.com/office/powerpoint/2010/main" val="205603675"/>
+        <p14:creationId xmlns:p14="http://schemas.microsoft.com/office/powerpoint/2010/main" xmlns="" val="205603675"/>
       </p:ext>
     </p:extLst>
   </p:cSld>
@@ -17429,6 +17537,124 @@
 </file>
 
 <file path=ppt/slides/slide10.xml><?xml version="1.0" encoding="utf-8"?>
+<p:sld xmlns:a="http://schemas.openxmlformats.org/drawingml/2006/main" xmlns:r="http://schemas.openxmlformats.org/officeDocument/2006/relationships" xmlns:p="http://schemas.openxmlformats.org/presentationml/2006/main">
+  <p:cSld>
+    <p:spTree>
+      <p:nvGrpSpPr>
+        <p:cNvPr id="1" name=""/>
+        <p:cNvGrpSpPr/>
+        <p:nvPr/>
+      </p:nvGrpSpPr>
+      <p:grpSpPr>
+        <a:xfrm>
+          <a:off x="0" y="0"/>
+          <a:ext cx="0" cy="0"/>
+          <a:chOff x="0" y="0"/>
+          <a:chExt cx="0" cy="0"/>
+        </a:xfrm>
+      </p:grpSpPr>
+      <p:graphicFrame>
+        <p:nvGraphicFramePr>
+          <p:cNvPr id="4" name="Diagram 3"/>
+          <p:cNvGraphicFramePr/>
+          <p:nvPr>
+            <p:extLst>
+              <p:ext uri="{D42A27DB-BD31-4B8C-83A1-F6EECF244321}">
+                <p14:modId xmlns:p14="http://schemas.microsoft.com/office/powerpoint/2010/main" xmlns="" val="1983174592"/>
+              </p:ext>
+            </p:extLst>
+          </p:nvPr>
+        </p:nvGraphicFramePr>
+        <p:xfrm>
+          <a:off x="1446924" y="1418896"/>
+          <a:ext cx="8128000" cy="3120782"/>
+        </p:xfrm>
+        <a:graphic>
+          <a:graphicData uri="http://schemas.openxmlformats.org/drawingml/2006/diagram">
+            <dgm:relIds xmlns:dgm="http://schemas.openxmlformats.org/drawingml/2006/diagram" xmlns:r="http://schemas.openxmlformats.org/officeDocument/2006/relationships" r:dm="rId2" r:lo="rId3" r:qs="rId4" r:cs="rId5"/>
+          </a:graphicData>
+        </a:graphic>
+      </p:graphicFrame>
+      <p:sp>
+        <p:nvSpPr>
+          <p:cNvPr id="6" name="Title 5"/>
+          <p:cNvSpPr>
+            <a:spLocks noGrp="1"/>
+          </p:cNvSpPr>
+          <p:nvPr>
+            <p:ph type="title"/>
+          </p:nvPr>
+        </p:nvSpPr>
+        <p:spPr/>
+        <p:txBody>
+          <a:bodyPr/>
+          <a:lstStyle/>
+          <a:p>
+            <a:r>
+              <a:rPr lang="en-US" dirty="0" smtClean="0"/>
+              <a:t>Option 2:  RR</a:t>
+            </a:r>
+            <a:endParaRPr lang="en-US" dirty="0"/>
+          </a:p>
+        </p:txBody>
+      </p:sp>
+      <p:sp>
+        <p:nvSpPr>
+          <p:cNvPr id="2" name="TextBox 1"/>
+          <p:cNvSpPr txBox="1"/>
+          <p:nvPr/>
+        </p:nvSpPr>
+        <p:spPr>
+          <a:xfrm>
+            <a:off x="1446924" y="4947118"/>
+            <a:ext cx="5940024" cy="646331"/>
+          </a:xfrm>
+          <a:prstGeom prst="rect">
+            <a:avLst/>
+          </a:prstGeom>
+          <a:noFill/>
+        </p:spPr>
+        <p:txBody>
+          <a:bodyPr wrap="none" rtlCol="0">
+            <a:spAutoFit/>
+          </a:bodyPr>
+          <a:lstStyle/>
+          <a:p>
+            <a:pPr marL="285750" indent="-285750">
+              <a:buFont typeface="Arial" charset="0"/>
+              <a:buChar char="•"/>
+            </a:pPr>
+            <a:r>
+              <a:rPr lang="en-US" dirty="0" smtClean="0"/>
+              <a:t>Communication resource is already good fit - see option 3 </a:t>
+            </a:r>
+          </a:p>
+          <a:p>
+            <a:pPr marL="285750" indent="-285750">
+              <a:buFont typeface="Arial" charset="0"/>
+              <a:buChar char="•"/>
+            </a:pPr>
+            <a:r>
+              <a:rPr lang="en-US" dirty="0" smtClean="0"/>
+              <a:t>NOT RECOMMENDED APPROACH</a:t>
+            </a:r>
+          </a:p>
+        </p:txBody>
+      </p:sp>
+    </p:spTree>
+    <p:extLst>
+      <p:ext uri="{BB962C8B-B14F-4D97-AF65-F5344CB8AC3E}">
+        <p14:creationId xmlns:p14="http://schemas.microsoft.com/office/powerpoint/2010/main" xmlns="" val="1923476008"/>
+      </p:ext>
+    </p:extLst>
+  </p:cSld>
+  <p:clrMapOvr>
+    <a:masterClrMapping/>
+  </p:clrMapOvr>
+</p:sld>
+</file>
+
+<file path=ppt/slides/slide11.xml><?xml version="1.0" encoding="utf-8"?>
 <p:sld xmlns:a="http://schemas.openxmlformats.org/drawingml/2006/main" xmlns:r="http://schemas.openxmlformats.org/officeDocument/2006/relationships" xmlns:p="http://schemas.openxmlformats.org/presentationml/2006/main">
   <p:cSld>
     <p:spTree>
@@ -17484,7 +17710,7 @@
     </p:spTree>
     <p:extLst>
       <p:ext uri="{BB962C8B-B14F-4D97-AF65-F5344CB8AC3E}">
-        <p14:creationId xmlns:p14="http://schemas.microsoft.com/office/powerpoint/2010/main" val="1135370845"/>
+        <p14:creationId xmlns:p14="http://schemas.microsoft.com/office/powerpoint/2010/main" xmlns="" val="1135370845"/>
       </p:ext>
     </p:extLst>
   </p:cSld>
@@ -17494,7 +17720,7 @@
 </p:sld>
 </file>
 
-<file path=ppt/slides/slide11.xml><?xml version="1.0" encoding="utf-8"?>
+<file path=ppt/slides/slide12.xml><?xml version="1.0" encoding="utf-8"?>
 <p:sld xmlns:a="http://schemas.openxmlformats.org/drawingml/2006/main" xmlns:r="http://schemas.openxmlformats.org/officeDocument/2006/relationships" xmlns:p="http://schemas.openxmlformats.org/presentationml/2006/main">
   <p:cSld>
     <p:spTree>
@@ -17596,7 +17822,7 @@
     </p:spTree>
     <p:extLst>
       <p:ext uri="{BB962C8B-B14F-4D97-AF65-F5344CB8AC3E}">
-        <p14:creationId xmlns:p14="http://schemas.microsoft.com/office/powerpoint/2010/main" val="1142930005"/>
+        <p14:creationId xmlns:p14="http://schemas.microsoft.com/office/powerpoint/2010/main" xmlns="" val="1142930005"/>
       </p:ext>
     </p:extLst>
   </p:cSld>
@@ -17606,7 +17832,7 @@
 </p:sld>
 </file>
 
-<file path=ppt/slides/slide12.xml><?xml version="1.0" encoding="utf-8"?>
+<file path=ppt/slides/slide13.xml><?xml version="1.0" encoding="utf-8"?>
 <p:sld xmlns:a="http://schemas.openxmlformats.org/drawingml/2006/main" xmlns:r="http://schemas.openxmlformats.org/officeDocument/2006/relationships" xmlns:p="http://schemas.openxmlformats.org/presentationml/2006/main">
   <p:cSld>
     <p:spTree>
@@ -17630,7 +17856,7 @@
           <p:nvPr>
             <p:extLst>
               <p:ext uri="{D42A27DB-BD31-4B8C-83A1-F6EECF244321}">
-                <p14:modId xmlns:p14="http://schemas.microsoft.com/office/powerpoint/2010/main" val="959132428"/>
+                <p14:modId xmlns:p14="http://schemas.microsoft.com/office/powerpoint/2010/main" xmlns="" val="959132428"/>
               </p:ext>
             </p:extLst>
           </p:nvPr>
@@ -17715,60 +17941,7 @@
     </p:spTree>
     <p:extLst>
       <p:ext uri="{BB962C8B-B14F-4D97-AF65-F5344CB8AC3E}">
-        <p14:creationId xmlns:p14="http://schemas.microsoft.com/office/powerpoint/2010/main" val="522840387"/>
-      </p:ext>
-    </p:extLst>
-  </p:cSld>
-  <p:clrMapOvr>
-    <a:masterClrMapping/>
-  </p:clrMapOvr>
-</p:sld>
-</file>
-
-<file path=ppt/slides/slide13.xml><?xml version="1.0" encoding="utf-8"?>
-<p:sld xmlns:a="http://schemas.openxmlformats.org/drawingml/2006/main" xmlns:r="http://schemas.openxmlformats.org/officeDocument/2006/relationships" xmlns:p="http://schemas.openxmlformats.org/presentationml/2006/main">
-  <p:cSld>
-    <p:spTree>
-      <p:nvGrpSpPr>
-        <p:cNvPr id="1" name=""/>
-        <p:cNvGrpSpPr/>
-        <p:nvPr/>
-      </p:nvGrpSpPr>
-      <p:grpSpPr>
-        <a:xfrm>
-          <a:off x="0" y="0"/>
-          <a:ext cx="0" cy="0"/>
-          <a:chOff x="0" y="0"/>
-          <a:chExt cx="0" cy="0"/>
-        </a:xfrm>
-      </p:grpSpPr>
-      <p:sp>
-        <p:nvSpPr>
-          <p:cNvPr id="2" name="Title 1"/>
-          <p:cNvSpPr>
-            <a:spLocks noGrp="1"/>
-          </p:cNvSpPr>
-          <p:nvPr>
-            <p:ph type="title"/>
-          </p:nvPr>
-        </p:nvSpPr>
-        <p:spPr/>
-        <p:txBody>
-          <a:bodyPr/>
-          <a:lstStyle/>
-          <a:p>
-            <a:r>
-              <a:rPr lang="en-US" dirty="0" smtClean="0"/>
-              <a:t>Pretty graphic here</a:t>
-            </a:r>
-            <a:endParaRPr lang="en-US" dirty="0"/>
-          </a:p>
-        </p:txBody>
-      </p:sp>
-    </p:spTree>
-    <p:extLst>
-      <p:ext uri="{BB962C8B-B14F-4D97-AF65-F5344CB8AC3E}">
-        <p14:creationId xmlns:p14="http://schemas.microsoft.com/office/powerpoint/2010/main" val="1529005150"/>
+        <p14:creationId xmlns:p14="http://schemas.microsoft.com/office/powerpoint/2010/main" xmlns="" val="522840387"/>
       </p:ext>
     </p:extLst>
   </p:cSld>
@@ -17802,7 +17975,7 @@
           <p:nvPr>
             <p:extLst>
               <p:ext uri="{D42A27DB-BD31-4B8C-83A1-F6EECF244321}">
-                <p14:modId xmlns:p14="http://schemas.microsoft.com/office/powerpoint/2010/main" val="867526383"/>
+                <p14:modId xmlns:p14="http://schemas.microsoft.com/office/powerpoint/2010/main" xmlns="" val="867526383"/>
               </p:ext>
             </p:extLst>
           </p:nvPr>
@@ -17928,7 +18101,7 @@
     </p:spTree>
     <p:extLst>
       <p:ext uri="{BB962C8B-B14F-4D97-AF65-F5344CB8AC3E}">
-        <p14:creationId xmlns:p14="http://schemas.microsoft.com/office/powerpoint/2010/main" val="1803123195"/>
+        <p14:creationId xmlns:p14="http://schemas.microsoft.com/office/powerpoint/2010/main" xmlns="" val="1803123195"/>
       </p:ext>
     </p:extLst>
   </p:cSld>
@@ -17990,7 +18163,7 @@
           <a:blip r:embed="rId2">
             <a:extLst>
               <a:ext uri="{28A0092B-C50C-407E-A947-70E740481C1C}">
-                <a14:useLocalDpi xmlns:a14="http://schemas.microsoft.com/office/drawing/2010/main" val="0"/>
+                <a14:useLocalDpi xmlns:a14="http://schemas.microsoft.com/office/drawing/2010/main" xmlns="" val="0"/>
               </a:ext>
             </a:extLst>
           </a:blip>
@@ -18223,7 +18396,7 @@
     </p:spTree>
     <p:extLst>
       <p:ext uri="{BB962C8B-B14F-4D97-AF65-F5344CB8AC3E}">
-        <p14:creationId xmlns:p14="http://schemas.microsoft.com/office/powerpoint/2010/main" val="1907014446"/>
+        <p14:creationId xmlns:p14="http://schemas.microsoft.com/office/powerpoint/2010/main" xmlns="" val="1907014446"/>
       </p:ext>
     </p:extLst>
   </p:cSld>
@@ -18250,6 +18423,174 @@
           <a:chExt cx="0" cy="0"/>
         </a:xfrm>
       </p:grpSpPr>
+      <p:sp>
+        <p:nvSpPr>
+          <p:cNvPr id="2" name="Title 1"/>
+          <p:cNvSpPr>
+            <a:spLocks noGrp="1"/>
+          </p:cNvSpPr>
+          <p:nvPr>
+            <p:ph type="title"/>
+          </p:nvPr>
+        </p:nvSpPr>
+        <p:spPr>
+          <a:xfrm>
+            <a:off x="668215" y="365125"/>
+            <a:ext cx="10955215" cy="1325563"/>
+          </a:xfrm>
+        </p:spPr>
+        <p:txBody>
+          <a:bodyPr>
+            <a:normAutofit/>
+          </a:bodyPr>
+          <a:lstStyle/>
+          <a:p>
+            <a:r>
+              <a:rPr lang="en-US" sz="4000" dirty="0" smtClean="0"/>
+              <a:t>The </a:t>
+            </a:r>
+            <a:r>
+              <a:rPr lang="en-US" sz="4000" dirty="0" err="1" smtClean="0"/>
+              <a:t>EICR</a:t>
+            </a:r>
+            <a:r>
+              <a:rPr lang="en-US" sz="4000" dirty="0" smtClean="0"/>
+              <a:t> </a:t>
+            </a:r>
+            <a:r>
+              <a:rPr lang="en-US" sz="4000" dirty="0" err="1" smtClean="0"/>
+              <a:t>CCDA</a:t>
+            </a:r>
+            <a:r>
+              <a:rPr lang="en-US" sz="4000" dirty="0" smtClean="0"/>
+              <a:t> on FHIR Profile defined to the entry level</a:t>
+            </a:r>
+            <a:endParaRPr lang="en-US" sz="4000" dirty="0"/>
+          </a:p>
+        </p:txBody>
+      </p:sp>
+      <p:pic>
+        <p:nvPicPr>
+          <p:cNvPr id="1026" name="Picture 2"/>
+          <p:cNvPicPr>
+            <a:picLocks noChangeAspect="1" noChangeArrowheads="1"/>
+          </p:cNvPicPr>
+          <p:nvPr/>
+        </p:nvPicPr>
+        <p:blipFill>
+          <a:blip r:embed="rId2"/>
+          <a:srcRect/>
+          <a:stretch>
+            <a:fillRect/>
+          </a:stretch>
+        </p:blipFill>
+        <p:spPr bwMode="auto">
+          <a:xfrm>
+            <a:off x="1767253" y="1455156"/>
+            <a:ext cx="6084277" cy="5262900"/>
+          </a:xfrm>
+          <a:prstGeom prst="rect">
+            <a:avLst/>
+          </a:prstGeom>
+          <a:noFill/>
+          <a:ln w="9525">
+            <a:solidFill>
+              <a:schemeClr val="accent1"/>
+            </a:solidFill>
+            <a:miter lim="800000"/>
+            <a:headEnd/>
+            <a:tailEnd/>
+          </a:ln>
+          <a:effectLst>
+            <a:outerShdw blurRad="50800" dist="38100" dir="2700000" algn="tl" rotWithShape="0">
+              <a:prstClr val="black">
+                <a:alpha val="40000"/>
+              </a:prstClr>
+            </a:outerShdw>
+          </a:effectLst>
+        </p:spPr>
+      </p:pic>
+      <p:sp>
+        <p:nvSpPr>
+          <p:cNvPr id="3" name="TextBox 2"/>
+          <p:cNvSpPr txBox="1"/>
+          <p:nvPr/>
+        </p:nvSpPr>
+        <p:spPr>
+          <a:xfrm>
+            <a:off x="1248507" y="5600700"/>
+            <a:ext cx="9525000" cy="369332"/>
+          </a:xfrm>
+          <a:prstGeom prst="rect">
+            <a:avLst/>
+          </a:prstGeom>
+          <a:solidFill>
+            <a:schemeClr val="bg1"/>
+          </a:solidFill>
+          <a:ln>
+            <a:solidFill>
+              <a:schemeClr val="accent1"/>
+            </a:solidFill>
+          </a:ln>
+          <a:effectLst>
+            <a:outerShdw blurRad="50800" dist="38100" dir="2700000" algn="tl" rotWithShape="0">
+              <a:prstClr val="black">
+                <a:alpha val="40000"/>
+              </a:prstClr>
+            </a:outerShdw>
+          </a:effectLst>
+        </p:spPr>
+        <p:txBody>
+          <a:bodyPr wrap="square" rtlCol="0">
+            <a:spAutoFit/>
+          </a:bodyPr>
+          <a:lstStyle/>
+          <a:p>
+            <a:r>
+              <a:rPr lang="en-US" dirty="0" smtClean="0">
+                <a:hlinkClick r:id="rId3"/>
+              </a:rPr>
+              <a:t>http://</a:t>
+            </a:r>
+            <a:r>
+              <a:rPr lang="en-US" dirty="0" smtClean="0">
+                <a:hlinkClick r:id="rId3"/>
+              </a:rPr>
+              <a:t>build.fhir.org/ig/Healthedata1/case-reporting/StructureDefinition-eicr-ccda-on-fhir.html</a:t>
+            </a:r>
+            <a:r>
+              <a:rPr lang="en-US" sz="1200" dirty="0" smtClean="0"/>
+              <a:t> </a:t>
+            </a:r>
+            <a:endParaRPr lang="en-US" dirty="0"/>
+          </a:p>
+        </p:txBody>
+      </p:sp>
+    </p:spTree>
+  </p:cSld>
+  <p:clrMapOvr>
+    <a:masterClrMapping/>
+  </p:clrMapOvr>
+</p:sld>
+</file>
+
+<file path=ppt/slides/slide5.xml><?xml version="1.0" encoding="utf-8"?>
+<p:sld xmlns:a="http://schemas.openxmlformats.org/drawingml/2006/main" xmlns:r="http://schemas.openxmlformats.org/officeDocument/2006/relationships" xmlns:p="http://schemas.openxmlformats.org/presentationml/2006/main">
+  <p:cSld>
+    <p:spTree>
+      <p:nvGrpSpPr>
+        <p:cNvPr id="1" name=""/>
+        <p:cNvGrpSpPr/>
+        <p:nvPr/>
+      </p:nvGrpSpPr>
+      <p:grpSpPr>
+        <a:xfrm>
+          <a:off x="0" y="0"/>
+          <a:ext cx="0" cy="0"/>
+          <a:chOff x="0" y="0"/>
+          <a:chExt cx="0" cy="0"/>
+        </a:xfrm>
+      </p:grpSpPr>
       <p:graphicFrame>
         <p:nvGraphicFramePr>
           <p:cNvPr id="4" name="Diagram 3"/>
@@ -18257,7 +18598,7 @@
           <p:nvPr>
             <p:extLst>
               <p:ext uri="{D42A27DB-BD31-4B8C-83A1-F6EECF244321}">
-                <p14:modId xmlns:p14="http://schemas.microsoft.com/office/powerpoint/2010/main" val="283573417"/>
+                <p14:modId xmlns:p14="http://schemas.microsoft.com/office/powerpoint/2010/main" xmlns="" val="283573417"/>
               </p:ext>
             </p:extLst>
           </p:nvPr>
@@ -18328,7 +18669,7 @@
     </p:spTree>
     <p:extLst>
       <p:ext uri="{BB962C8B-B14F-4D97-AF65-F5344CB8AC3E}">
-        <p14:creationId xmlns:p14="http://schemas.microsoft.com/office/powerpoint/2010/main" val="1760805663"/>
+        <p14:creationId xmlns:p14="http://schemas.microsoft.com/office/powerpoint/2010/main" xmlns="" val="1760805663"/>
       </p:ext>
     </p:extLst>
   </p:cSld>
@@ -18338,7 +18679,7 @@
 </p:sld>
 </file>
 
-<file path=ppt/slides/slide5.xml><?xml version="1.0" encoding="utf-8"?>
+<file path=ppt/slides/slide6.xml><?xml version="1.0" encoding="utf-8"?>
 <p:sld xmlns:a="http://schemas.openxmlformats.org/drawingml/2006/main" xmlns:r="http://schemas.openxmlformats.org/officeDocument/2006/relationships" xmlns:p="http://schemas.openxmlformats.org/presentationml/2006/main">
   <p:cSld>
     <p:spTree>
@@ -18390,7 +18731,7 @@
     </p:spTree>
     <p:extLst>
       <p:ext uri="{BB962C8B-B14F-4D97-AF65-F5344CB8AC3E}">
-        <p14:creationId xmlns:p14="http://schemas.microsoft.com/office/powerpoint/2010/main" val="806174961"/>
+        <p14:creationId xmlns:p14="http://schemas.microsoft.com/office/powerpoint/2010/main" xmlns="" val="806174961"/>
       </p:ext>
     </p:extLst>
   </p:cSld>
@@ -18400,7 +18741,7 @@
 </p:sld>
 </file>
 
-<file path=ppt/slides/slide6.xml><?xml version="1.0" encoding="utf-8"?>
+<file path=ppt/slides/slide7.xml><?xml version="1.0" encoding="utf-8"?>
 <p:sld xmlns:a="http://schemas.openxmlformats.org/drawingml/2006/main" xmlns:r="http://schemas.openxmlformats.org/officeDocument/2006/relationships" xmlns:p="http://schemas.openxmlformats.org/presentationml/2006/main">
   <p:cSld>
     <p:spTree>
@@ -18424,7 +18765,7 @@
           <p:nvPr>
             <p:extLst>
               <p:ext uri="{D42A27DB-BD31-4B8C-83A1-F6EECF244321}">
-                <p14:modId xmlns:p14="http://schemas.microsoft.com/office/powerpoint/2010/main" val="1718515934"/>
+                <p14:modId xmlns:p14="http://schemas.microsoft.com/office/powerpoint/2010/main" xmlns="" val="1718515934"/>
               </p:ext>
             </p:extLst>
           </p:nvPr>
@@ -18509,7 +18850,7 @@
     </p:spTree>
     <p:extLst>
       <p:ext uri="{BB962C8B-B14F-4D97-AF65-F5344CB8AC3E}">
-        <p14:creationId xmlns:p14="http://schemas.microsoft.com/office/powerpoint/2010/main" val="255209118"/>
+        <p14:creationId xmlns:p14="http://schemas.microsoft.com/office/powerpoint/2010/main" xmlns="" val="255209118"/>
       </p:ext>
     </p:extLst>
   </p:cSld>
@@ -18519,7 +18860,7 @@
 </p:sld>
 </file>
 
-<file path=ppt/slides/slide7.xml><?xml version="1.0" encoding="utf-8"?>
+<file path=ppt/slides/slide8.xml><?xml version="1.0" encoding="utf-8"?>
 <p:sld xmlns:a="http://schemas.openxmlformats.org/drawingml/2006/main" xmlns:r="http://schemas.openxmlformats.org/officeDocument/2006/relationships" xmlns:p="http://schemas.openxmlformats.org/presentationml/2006/main">
   <p:cSld>
     <p:spTree>
@@ -18571,7 +18912,7 @@
           <a:blip r:embed="rId2">
             <a:extLst>
               <a:ext uri="{28A0092B-C50C-407E-A947-70E740481C1C}">
-                <a14:useLocalDpi xmlns:a14="http://schemas.microsoft.com/office/drawing/2010/main" val="0"/>
+                <a14:useLocalDpi xmlns:a14="http://schemas.microsoft.com/office/drawing/2010/main" xmlns="" val="0"/>
               </a:ext>
             </a:extLst>
           </a:blip>
@@ -18784,7 +19125,7 @@
           <a:blip r:embed="rId3">
             <a:extLst>
               <a:ext uri="{28A0092B-C50C-407E-A947-70E740481C1C}">
-                <a14:useLocalDpi xmlns:a14="http://schemas.microsoft.com/office/drawing/2010/main" val="0"/>
+                <a14:useLocalDpi xmlns:a14="http://schemas.microsoft.com/office/drawing/2010/main" xmlns="" val="0"/>
               </a:ext>
             </a:extLst>
           </a:blip>
@@ -18807,10 +19148,66 @@
           </a:ln>
         </p:spPr>
       </p:pic>
+      <p:sp>
+        <p:nvSpPr>
+          <p:cNvPr id="12" name="TextBox 11"/>
+          <p:cNvSpPr txBox="1"/>
+          <p:nvPr/>
+        </p:nvSpPr>
+        <p:spPr>
+          <a:xfrm>
+            <a:off x="6701338" y="6095246"/>
+            <a:ext cx="5372100" cy="276999"/>
+          </a:xfrm>
+          <a:prstGeom prst="rect">
+            <a:avLst/>
+          </a:prstGeom>
+          <a:solidFill>
+            <a:schemeClr val="bg1"/>
+          </a:solidFill>
+          <a:ln>
+            <a:solidFill>
+              <a:schemeClr val="accent1"/>
+            </a:solidFill>
+          </a:ln>
+          <a:effectLst>
+            <a:outerShdw blurRad="50800" dist="38100" dir="2700000" algn="tl" rotWithShape="0">
+              <a:prstClr val="black">
+                <a:alpha val="40000"/>
+              </a:prstClr>
+            </a:outerShdw>
+          </a:effectLst>
+        </p:spPr>
+        <p:txBody>
+          <a:bodyPr wrap="square" rtlCol="0">
+            <a:spAutoFit/>
+          </a:bodyPr>
+          <a:lstStyle/>
+          <a:p>
+            <a:r>
+              <a:rPr lang="en-US" sz="1200" dirty="0" smtClean="0">
+                <a:hlinkClick r:id="rId4"/>
+              </a:rPr>
+              <a:t>http://</a:t>
+            </a:r>
+            <a:r>
+              <a:rPr lang="en-US" sz="1200" dirty="0" smtClean="0">
+                <a:hlinkClick r:id="rId4"/>
+              </a:rPr>
+              <a:t>build.fhir.org/ig/Healthedata1/case-reporting/StructureDefinition-EICR.html</a:t>
+            </a:r>
+            <a:r>
+              <a:rPr lang="en-US" sz="1200" dirty="0" smtClean="0"/>
+              <a:t> </a:t>
+            </a:r>
+            <a:endParaRPr lang="en-US" sz="1200" dirty="0"/>
+          </a:p>
+        </p:txBody>
+      </p:sp>
     </p:spTree>
     <p:extLst>
       <p:ext uri="{BB962C8B-B14F-4D97-AF65-F5344CB8AC3E}">
-        <p14:creationId xmlns:p14="http://schemas.microsoft.com/office/powerpoint/2010/main" val="1994540208"/>
+        <p14:creationId xmlns:p14="http://schemas.microsoft.com/office/powerpoint/2010/main" xmlns="" val="1994540208"/>
       </p:ext>
     </p:extLst>
   </p:cSld>
@@ -18820,7 +19217,7 @@
 </p:sld>
 </file>
 
-<file path=ppt/slides/slide8.xml><?xml version="1.0" encoding="utf-8"?>
+<file path=ppt/slides/slide9.xml><?xml version="1.0" encoding="utf-8"?>
 <p:sld xmlns:a="http://schemas.openxmlformats.org/drawingml/2006/main" xmlns:r="http://schemas.openxmlformats.org/officeDocument/2006/relationships" xmlns:p="http://schemas.openxmlformats.org/presentationml/2006/main">
   <p:cSld>
     <p:spTree>
@@ -19081,16 +19478,16 @@
           <a:p>
             <a:pPr algn="ctr"/>
             <a:r>
+              <a:rPr lang="en-US" dirty="0" smtClean="0"/>
+              <a:t>Draft </a:t>
+            </a:r>
+            <a:r>
               <a:rPr lang="en-US" dirty="0" err="1" smtClean="0"/>
               <a:t>CaseReport</a:t>
             </a:r>
             <a:r>
               <a:rPr lang="en-US" dirty="0" smtClean="0"/>
-              <a:t> </a:t>
-            </a:r>
-            <a:r>
-              <a:rPr lang="en-US" dirty="0" err="1" smtClean="0"/>
-              <a:t>Resouce</a:t>
+              <a:t> Resource</a:t>
             </a:r>
             <a:endParaRPr lang="en-US" dirty="0"/>
           </a:p>
@@ -19108,7 +19505,7 @@
           <a:blip r:embed="rId2">
             <a:extLst>
               <a:ext uri="{28A0092B-C50C-407E-A947-70E740481C1C}">
-                <a14:useLocalDpi xmlns:a14="http://schemas.microsoft.com/office/drawing/2010/main" val="0"/>
+                <a14:useLocalDpi xmlns:a14="http://schemas.microsoft.com/office/drawing/2010/main" xmlns="" val="0"/>
               </a:ext>
             </a:extLst>
           </a:blip>
@@ -19143,7 +19540,7 @@
           <a:blip r:embed="rId3">
             <a:extLst>
               <a:ext uri="{28A0092B-C50C-407E-A947-70E740481C1C}">
-                <a14:useLocalDpi xmlns:a14="http://schemas.microsoft.com/office/drawing/2010/main" val="0"/>
+                <a14:useLocalDpi xmlns:a14="http://schemas.microsoft.com/office/drawing/2010/main" xmlns="" val="0"/>
               </a:ext>
             </a:extLst>
           </a:blip>
@@ -19166,128 +19563,47 @@
           </a:ln>
         </p:spPr>
       </p:pic>
-    </p:spTree>
-    <p:extLst>
-      <p:ext uri="{BB962C8B-B14F-4D97-AF65-F5344CB8AC3E}">
-        <p14:creationId xmlns:p14="http://schemas.microsoft.com/office/powerpoint/2010/main" val="126799764"/>
-      </p:ext>
-    </p:extLst>
-  </p:cSld>
-  <p:clrMapOvr>
-    <a:masterClrMapping/>
-  </p:clrMapOvr>
-</p:sld>
-</file>
-
-<file path=ppt/slides/slide9.xml><?xml version="1.0" encoding="utf-8"?>
-<p:sld xmlns:a="http://schemas.openxmlformats.org/drawingml/2006/main" xmlns:r="http://schemas.openxmlformats.org/officeDocument/2006/relationships" xmlns:p="http://schemas.openxmlformats.org/presentationml/2006/main">
-  <p:cSld>
-    <p:spTree>
-      <p:nvGrpSpPr>
-        <p:cNvPr id="1" name=""/>
-        <p:cNvGrpSpPr/>
-        <p:nvPr/>
-      </p:nvGrpSpPr>
-      <p:grpSpPr>
-        <a:xfrm>
-          <a:off x="0" y="0"/>
-          <a:ext cx="0" cy="0"/>
-          <a:chOff x="0" y="0"/>
-          <a:chExt cx="0" cy="0"/>
-        </a:xfrm>
-      </p:grpSpPr>
-      <p:graphicFrame>
-        <p:nvGraphicFramePr>
-          <p:cNvPr id="4" name="Diagram 3"/>
-          <p:cNvGraphicFramePr/>
-          <p:nvPr>
-            <p:extLst>
-              <p:ext uri="{D42A27DB-BD31-4B8C-83A1-F6EECF244321}">
-                <p14:modId xmlns:p14="http://schemas.microsoft.com/office/powerpoint/2010/main" val="1983174592"/>
-              </p:ext>
-            </p:extLst>
-          </p:nvPr>
-        </p:nvGraphicFramePr>
-        <p:xfrm>
-          <a:off x="1446924" y="1418896"/>
-          <a:ext cx="8128000" cy="3120782"/>
-        </p:xfrm>
-        <a:graphic>
-          <a:graphicData uri="http://schemas.openxmlformats.org/drawingml/2006/diagram">
-            <dgm:relIds xmlns:dgm="http://schemas.openxmlformats.org/drawingml/2006/diagram" xmlns:r="http://schemas.openxmlformats.org/officeDocument/2006/relationships" r:dm="rId2" r:lo="rId3" r:qs="rId4" r:cs="rId5"/>
-          </a:graphicData>
-        </a:graphic>
-      </p:graphicFrame>
       <p:sp>
         <p:nvSpPr>
-          <p:cNvPr id="6" name="Title 5"/>
-          <p:cNvSpPr>
-            <a:spLocks noGrp="1"/>
-          </p:cNvSpPr>
-          <p:nvPr>
-            <p:ph type="title"/>
-          </p:nvPr>
-        </p:nvSpPr>
-        <p:spPr/>
-        <p:txBody>
-          <a:bodyPr/>
-          <a:lstStyle/>
-          <a:p>
-            <a:r>
-              <a:rPr lang="en-US" dirty="0" smtClean="0"/>
-              <a:t>Option 2:  RR</a:t>
-            </a:r>
-            <a:endParaRPr lang="en-US" dirty="0"/>
-          </a:p>
-        </p:txBody>
-      </p:sp>
-      <p:sp>
-        <p:nvSpPr>
-          <p:cNvPr id="2" name="TextBox 1"/>
+          <p:cNvPr id="12" name="TextBox 11"/>
           <p:cNvSpPr txBox="1"/>
           <p:nvPr/>
         </p:nvSpPr>
         <p:spPr>
           <a:xfrm>
-            <a:off x="1446924" y="4947118"/>
-            <a:ext cx="5940024" cy="646331"/>
+            <a:off x="5908431" y="6093042"/>
+            <a:ext cx="4642339" cy="369332"/>
           </a:xfrm>
           <a:prstGeom prst="rect">
             <a:avLst/>
           </a:prstGeom>
-          <a:noFill/>
+          <a:solidFill>
+            <a:schemeClr val="bg1"/>
+          </a:solidFill>
+          <a:ln>
+            <a:solidFill>
+              <a:schemeClr val="accent1"/>
+            </a:solidFill>
+          </a:ln>
         </p:spPr>
         <p:txBody>
-          <a:bodyPr wrap="none" rtlCol="0">
+          <a:bodyPr wrap="square" rtlCol="0">
             <a:spAutoFit/>
           </a:bodyPr>
           <a:lstStyle/>
           <a:p>
-            <a:pPr marL="285750" indent="-285750">
-              <a:buFont typeface="Arial" charset="0"/>
-              <a:buChar char="•"/>
-            </a:pPr>
             <a:r>
               <a:rPr lang="en-US" dirty="0" smtClean="0"/>
-              <a:t>Communication resource is already good fit - see option 3 </a:t>
+              <a:t>Not published online– available on request</a:t>
             </a:r>
-          </a:p>
-          <a:p>
-            <a:pPr marL="285750" indent="-285750">
-              <a:buFont typeface="Arial" charset="0"/>
-              <a:buChar char="•"/>
-            </a:pPr>
-            <a:r>
-              <a:rPr lang="en-US" dirty="0" smtClean="0"/>
-              <a:t>NOT RECOMMENDED APPROACH</a:t>
-            </a:r>
+            <a:endParaRPr lang="en-US" dirty="0"/>
           </a:p>
         </p:txBody>
       </p:sp>
     </p:spTree>
     <p:extLst>
       <p:ext uri="{BB962C8B-B14F-4D97-AF65-F5344CB8AC3E}">
-        <p14:creationId xmlns:p14="http://schemas.microsoft.com/office/powerpoint/2010/main" val="1923476008"/>
+        <p14:creationId xmlns:p14="http://schemas.microsoft.com/office/powerpoint/2010/main" xmlns="" val="126799764"/>
       </p:ext>
     </p:extLst>
   </p:cSld>
@@ -19340,7 +19656,7 @@
     </a:clrScheme>
     <a:fontScheme name="Office">
       <a:majorFont>
-        <a:latin typeface="Calibri Light" panose="020F0302020204030204"/>
+        <a:latin typeface="Calibri Light"/>
         <a:ea typeface=""/>
         <a:cs typeface=""/>
         <a:font script="Jpan" typeface="Yu Gothic Light"/>
@@ -19375,7 +19691,7 @@
         <a:font script="Geor" typeface="Sylfaen"/>
       </a:majorFont>
       <a:minorFont>
-        <a:latin typeface="Calibri" panose="020F0502020204030204"/>
+        <a:latin typeface="Calibri"/>
         <a:ea typeface=""/>
         <a:cs typeface=""/>
         <a:font script="Jpan" typeface="Yu Gothic"/>
@@ -19552,7 +19868,7 @@
   <a:extraClrSchemeLst/>
   <a:extLst>
     <a:ext uri="{05A4C25C-085E-4340-85A3-A5531E510DB2}">
-      <thm15:themeFamily xmlns:thm15="http://schemas.microsoft.com/office/thememl/2012/main" name="Office Theme" id="{62F939B6-93AF-4DB8-9C6B-D6C7DFDC589F}" vid="{4A3C46E8-61CC-4603-A589-7422A47A8E4A}"/>
+      <thm15:themeFamily xmlns:thm15="http://schemas.microsoft.com/office/thememl/2012/main" xmlns="" name="Office Theme" id="{62F939B6-93AF-4DB8-9C6B-D6C7DFDC589F}" vid="{4A3C46E8-61CC-4603-A589-7422A47A8E4A}"/>
     </a:ext>
   </a:extLst>
 </a:theme>

</xml_diff>